<commit_message>
Updated multiple slides with themes
No text/content modification has been done - only theme and at some
places, content holder re-alignments.
</commit_message>
<xml_diff>
--- a/OS-Neutron-DHCP.pptx
+++ b/OS-Neutron-DHCP.pptx
@@ -2,7 +2,7 @@
 <file path=ppt/presentation.xml><?xml version="1.0" encoding="utf-8"?>
 <p:presentation xmlns:a="http://schemas.openxmlformats.org/drawingml/2006/main" xmlns:r="http://schemas.openxmlformats.org/officeDocument/2006/relationships" xmlns:p="http://schemas.openxmlformats.org/presentationml/2006/main" saveSubsetFonts="1">
   <p:sldMasterIdLst>
-    <p:sldMasterId id="2147483648" r:id="rId1"/>
+    <p:sldMasterId id="2147483673" r:id="rId1"/>
   </p:sldMasterIdLst>
   <p:notesMasterIdLst>
     <p:notesMasterId r:id="rId20"/>
@@ -124,6 +124,22 @@
       </a:defRPr>
     </a:lvl9pPr>
   </p:defaultTextStyle>
+  <p:extLst>
+    <p:ext uri="{EFAFB233-063F-42B5-8137-9DF3F51BA10A}">
+      <p15:sldGuideLst xmlns:p15="http://schemas.microsoft.com/office/powerpoint/2012/main">
+        <p15:guide id="1" orient="horz" pos="2160">
+          <p15:clr>
+            <a:srgbClr val="A4A3A4"/>
+          </p15:clr>
+        </p15:guide>
+        <p15:guide id="2" pos="2880">
+          <p15:clr>
+            <a:srgbClr val="A4A3A4"/>
+          </p15:clr>
+        </p15:guide>
+      </p15:sldGuideLst>
+    </p:ext>
+  </p:extLst>
 </p:presentation>
 </file>
 
@@ -209,7 +225,7 @@
           <a:p>
             <a:fld id="{47CE9C51-0B48-4108-9AEC-E6CA09D27157}" type="datetimeFigureOut">
               <a:rPr lang="en-US" smtClean="0"/>
-              <a:t>8/7/2015</a:t>
+              <a:t>8/7/15</a:t>
             </a:fld>
             <a:endParaRPr lang="en-US"/>
           </a:p>
@@ -917,19 +933,25 @@
         </p:nvSpPr>
         <p:spPr>
           <a:xfrm>
-            <a:off x="685800" y="2130425"/>
+            <a:off x="685800" y="2130427"/>
             <a:ext cx="7772400" cy="1470025"/>
           </a:xfrm>
         </p:spPr>
         <p:txBody>
-          <a:bodyPr/>
-          <a:lstStyle/>
+          <a:bodyPr>
+            <a:normAutofit/>
+          </a:bodyPr>
+          <a:lstStyle>
+            <a:lvl1pPr algn="ctr">
+              <a:defRPr sz="3000"/>
+            </a:lvl1pPr>
+          </a:lstStyle>
           <a:p>
             <a:r>
               <a:rPr lang="en-US" smtClean="0"/>
               <a:t>Click to edit Master title style</a:t>
             </a:r>
-            <a:endParaRPr lang="en-US"/>
+            <a:endParaRPr lang="en-IN" dirty="0"/>
           </a:p>
         </p:txBody>
       </p:sp>
@@ -962,7 +984,7 @@
                 </a:solidFill>
               </a:defRPr>
             </a:lvl1pPr>
-            <a:lvl2pPr marL="457200" indent="0" algn="ctr">
+            <a:lvl2pPr marL="380985" indent="0" algn="ctr">
               <a:buNone/>
               <a:defRPr>
                 <a:solidFill>
@@ -972,7 +994,7 @@
                 </a:solidFill>
               </a:defRPr>
             </a:lvl2pPr>
-            <a:lvl3pPr marL="914400" indent="0" algn="ctr">
+            <a:lvl3pPr marL="761970" indent="0" algn="ctr">
               <a:buNone/>
               <a:defRPr>
                 <a:solidFill>
@@ -982,7 +1004,7 @@
                 </a:solidFill>
               </a:defRPr>
             </a:lvl3pPr>
-            <a:lvl4pPr marL="1371600" indent="0" algn="ctr">
+            <a:lvl4pPr marL="1142954" indent="0" algn="ctr">
               <a:buNone/>
               <a:defRPr>
                 <a:solidFill>
@@ -992,7 +1014,7 @@
                 </a:solidFill>
               </a:defRPr>
             </a:lvl4pPr>
-            <a:lvl5pPr marL="1828800" indent="0" algn="ctr">
+            <a:lvl5pPr marL="1523939" indent="0" algn="ctr">
               <a:buNone/>
               <a:defRPr>
                 <a:solidFill>
@@ -1002,7 +1024,7 @@
                 </a:solidFill>
               </a:defRPr>
             </a:lvl5pPr>
-            <a:lvl6pPr marL="2286000" indent="0" algn="ctr">
+            <a:lvl6pPr marL="1904924" indent="0" algn="ctr">
               <a:buNone/>
               <a:defRPr>
                 <a:solidFill>
@@ -1012,7 +1034,7 @@
                 </a:solidFill>
               </a:defRPr>
             </a:lvl6pPr>
-            <a:lvl7pPr marL="2743200" indent="0" algn="ctr">
+            <a:lvl7pPr marL="2285909" indent="0" algn="ctr">
               <a:buNone/>
               <a:defRPr>
                 <a:solidFill>
@@ -1022,7 +1044,7 @@
                 </a:solidFill>
               </a:defRPr>
             </a:lvl7pPr>
-            <a:lvl8pPr marL="3200400" indent="0" algn="ctr">
+            <a:lvl8pPr marL="2666893" indent="0" algn="ctr">
               <a:buNone/>
               <a:defRPr>
                 <a:solidFill>
@@ -1032,7 +1054,7 @@
                 </a:solidFill>
               </a:defRPr>
             </a:lvl8pPr>
-            <a:lvl9pPr marL="3657600" indent="0" algn="ctr">
+            <a:lvl9pPr marL="3047878" indent="0" algn="ctr">
               <a:buNone/>
               <a:defRPr>
                 <a:solidFill>
@@ -1048,7 +1070,7 @@
               <a:rPr lang="en-US" smtClean="0"/>
               <a:t>Click to edit Master subtitle style</a:t>
             </a:r>
-            <a:endParaRPr lang="en-US"/>
+            <a:endParaRPr lang="en-IN"/>
           </a:p>
         </p:txBody>
       </p:sp>
@@ -1070,7 +1092,7 @@
             <a:fld id="{1D8BD707-D9CF-40AE-B4C6-C98DA3205C09}" type="datetimeFigureOut">
               <a:rPr lang="en-US" smtClean="0"/>
               <a:pPr/>
-              <a:t>8/7/2015</a:t>
+              <a:t>8/7/15</a:t>
             </a:fld>
             <a:endParaRPr lang="en-US"/>
           </a:p>
@@ -1119,7 +1141,78 @@
           </a:p>
         </p:txBody>
       </p:sp>
+      <p:sp>
+        <p:nvSpPr>
+          <p:cNvPr id="7" name="Rectangle 6"/>
+          <p:cNvSpPr/>
+          <p:nvPr/>
+        </p:nvSpPr>
+        <p:spPr>
+          <a:xfrm>
+            <a:off x="9036498" y="0"/>
+            <a:ext cx="107503" cy="6858000"/>
+          </a:xfrm>
+          <a:prstGeom prst="rect">
+            <a:avLst/>
+          </a:prstGeom>
+          <a:gradFill>
+            <a:gsLst>
+              <a:gs pos="0">
+                <a:schemeClr val="accent6">
+                  <a:lumMod val="75000"/>
+                </a:schemeClr>
+              </a:gs>
+              <a:gs pos="50000">
+                <a:schemeClr val="accent6">
+                  <a:lumMod val="60000"/>
+                  <a:lumOff val="40000"/>
+                </a:schemeClr>
+              </a:gs>
+              <a:gs pos="100000">
+                <a:schemeClr val="accent6">
+                  <a:lumMod val="40000"/>
+                  <a:lumOff val="60000"/>
+                  <a:alpha val="69000"/>
+                </a:schemeClr>
+              </a:gs>
+            </a:gsLst>
+            <a:lin ang="5400000" scaled="0"/>
+          </a:gradFill>
+          <a:ln>
+            <a:noFill/>
+          </a:ln>
+        </p:spPr>
+        <p:style>
+          <a:lnRef idx="2">
+            <a:schemeClr val="accent1">
+              <a:shade val="50000"/>
+            </a:schemeClr>
+          </a:lnRef>
+          <a:fillRef idx="1">
+            <a:schemeClr val="accent1"/>
+          </a:fillRef>
+          <a:effectRef idx="0">
+            <a:schemeClr val="accent1"/>
+          </a:effectRef>
+          <a:fontRef idx="minor">
+            <a:schemeClr val="lt1"/>
+          </a:fontRef>
+        </p:style>
+        <p:txBody>
+          <a:bodyPr rtlCol="0" anchor="ctr"/>
+          <a:lstStyle/>
+          <a:p>
+            <a:pPr algn="ctr"/>
+            <a:endParaRPr lang="en-IN" sz="1167"/>
+          </a:p>
+        </p:txBody>
+      </p:sp>
     </p:spTree>
+    <p:extLst>
+      <p:ext uri="{BB962C8B-B14F-4D97-AF65-F5344CB8AC3E}">
+        <p14:creationId xmlns:p14="http://schemas.microsoft.com/office/powerpoint/2010/main" val="81458260"/>
+      </p:ext>
+    </p:extLst>
   </p:cSld>
   <p:clrMapOvr>
     <a:masterClrMapping/>
@@ -1163,7 +1256,7 @@
               <a:rPr lang="en-US" smtClean="0"/>
               <a:t>Click to edit Master title style</a:t>
             </a:r>
-            <a:endParaRPr lang="en-US"/>
+            <a:endParaRPr lang="en-IN"/>
           </a:p>
         </p:txBody>
       </p:sp>
@@ -1215,7 +1308,7 @@
               <a:rPr lang="en-US" smtClean="0"/>
               <a:t>Fifth level</a:t>
             </a:r>
-            <a:endParaRPr lang="en-US"/>
+            <a:endParaRPr lang="en-IN"/>
           </a:p>
         </p:txBody>
       </p:sp>
@@ -1237,7 +1330,7 @@
             <a:fld id="{1D8BD707-D9CF-40AE-B4C6-C98DA3205C09}" type="datetimeFigureOut">
               <a:rPr lang="en-US" smtClean="0"/>
               <a:pPr/>
-              <a:t>8/7/2015</a:t>
+              <a:t>8/7/15</a:t>
             </a:fld>
             <a:endParaRPr lang="en-US"/>
           </a:p>
@@ -1287,6 +1380,11 @@
         </p:txBody>
       </p:sp>
     </p:spTree>
+    <p:extLst>
+      <p:ext uri="{BB962C8B-B14F-4D97-AF65-F5344CB8AC3E}">
+        <p14:creationId xmlns:p14="http://schemas.microsoft.com/office/powerpoint/2010/main" val="1953534826"/>
+      </p:ext>
+    </p:extLst>
   </p:cSld>
   <p:clrMapOvr>
     <a:masterClrMapping/>
@@ -1323,7 +1421,7 @@
         </p:nvSpPr>
         <p:spPr>
           <a:xfrm>
-            <a:off x="6629400" y="274638"/>
+            <a:off x="6629400" y="274640"/>
             <a:ext cx="2057400" cy="5851525"/>
           </a:xfrm>
         </p:spPr>
@@ -1335,7 +1433,7 @@
               <a:rPr lang="en-US" smtClean="0"/>
               <a:t>Click to edit Master title style</a:t>
             </a:r>
-            <a:endParaRPr lang="en-US"/>
+            <a:endParaRPr lang="en-IN"/>
           </a:p>
         </p:txBody>
       </p:sp>
@@ -1351,7 +1449,7 @@
         </p:nvSpPr>
         <p:spPr>
           <a:xfrm>
-            <a:off x="457200" y="274638"/>
+            <a:off x="457200" y="274640"/>
             <a:ext cx="6019800" cy="5851525"/>
           </a:xfrm>
         </p:spPr>
@@ -1392,7 +1490,7 @@
               <a:rPr lang="en-US" smtClean="0"/>
               <a:t>Fifth level</a:t>
             </a:r>
-            <a:endParaRPr lang="en-US"/>
+            <a:endParaRPr lang="en-IN"/>
           </a:p>
         </p:txBody>
       </p:sp>
@@ -1414,7 +1512,7 @@
             <a:fld id="{1D8BD707-D9CF-40AE-B4C6-C98DA3205C09}" type="datetimeFigureOut">
               <a:rPr lang="en-US" smtClean="0"/>
               <a:pPr/>
-              <a:t>8/7/2015</a:t>
+              <a:t>8/7/15</a:t>
             </a:fld>
             <a:endParaRPr lang="en-US"/>
           </a:p>
@@ -1464,6 +1562,398 @@
         </p:txBody>
       </p:sp>
     </p:spTree>
+    <p:extLst>
+      <p:ext uri="{BB962C8B-B14F-4D97-AF65-F5344CB8AC3E}">
+        <p14:creationId xmlns:p14="http://schemas.microsoft.com/office/powerpoint/2010/main" val="1902736997"/>
+      </p:ext>
+    </p:extLst>
+  </p:cSld>
+  <p:clrMapOvr>
+    <a:masterClrMapping/>
+  </p:clrMapOvr>
+</p:sldLayout>
+</file>
+
+<file path=ppt/slideLayouts/slideLayout12.xml><?xml version="1.0" encoding="utf-8"?>
+<p:sldLayout xmlns:a="http://schemas.openxmlformats.org/drawingml/2006/main" xmlns:r="http://schemas.openxmlformats.org/officeDocument/2006/relationships" xmlns:p="http://schemas.openxmlformats.org/presentationml/2006/main" type="tx">
+  <p:cSld name="Title and Body">
+    <p:spTree>
+      <p:nvGrpSpPr>
+        <p:cNvPr id="1" name="Shape 12"/>
+        <p:cNvGrpSpPr/>
+        <p:nvPr/>
+      </p:nvGrpSpPr>
+      <p:grpSpPr>
+        <a:xfrm>
+          <a:off x="0" y="0"/>
+          <a:ext cx="0" cy="0"/>
+          <a:chOff x="0" y="0"/>
+          <a:chExt cx="0" cy="0"/>
+        </a:xfrm>
+      </p:grpSpPr>
+      <p:sp>
+        <p:nvSpPr>
+          <p:cNvPr id="13" name="Shape 13"/>
+          <p:cNvSpPr txBox="1">
+            <a:spLocks noGrp="1"/>
+          </p:cNvSpPr>
+          <p:nvPr>
+            <p:ph type="title"/>
+          </p:nvPr>
+        </p:nvSpPr>
+        <p:spPr>
+          <a:xfrm>
+            <a:off x="72701" y="274636"/>
+            <a:ext cx="8951100" cy="668159"/>
+          </a:xfrm>
+          <a:prstGeom prst="rect">
+            <a:avLst/>
+          </a:prstGeom>
+        </p:spPr>
+        <p:txBody>
+          <a:bodyPr lIns="91425" tIns="91425" rIns="91425" bIns="91425" anchor="b" anchorCtr="0"/>
+          <a:lstStyle>
+            <a:lvl1pPr>
+              <a:spcBef>
+                <a:spcPts val="0"/>
+              </a:spcBef>
+              <a:buSzPct val="100000"/>
+              <a:defRPr sz="2400"/>
+            </a:lvl1pPr>
+            <a:lvl2pPr>
+              <a:spcBef>
+                <a:spcPts val="0"/>
+              </a:spcBef>
+              <a:defRPr/>
+            </a:lvl2pPr>
+            <a:lvl3pPr>
+              <a:spcBef>
+                <a:spcPts val="0"/>
+              </a:spcBef>
+              <a:defRPr/>
+            </a:lvl3pPr>
+            <a:lvl4pPr>
+              <a:spcBef>
+                <a:spcPts val="0"/>
+              </a:spcBef>
+              <a:defRPr/>
+            </a:lvl4pPr>
+            <a:lvl5pPr>
+              <a:spcBef>
+                <a:spcPts val="0"/>
+              </a:spcBef>
+              <a:defRPr/>
+            </a:lvl5pPr>
+            <a:lvl6pPr>
+              <a:spcBef>
+                <a:spcPts val="0"/>
+              </a:spcBef>
+              <a:defRPr/>
+            </a:lvl6pPr>
+            <a:lvl7pPr>
+              <a:spcBef>
+                <a:spcPts val="0"/>
+              </a:spcBef>
+              <a:defRPr/>
+            </a:lvl7pPr>
+            <a:lvl8pPr>
+              <a:spcBef>
+                <a:spcPts val="0"/>
+              </a:spcBef>
+              <a:defRPr/>
+            </a:lvl8pPr>
+            <a:lvl9pPr>
+              <a:spcBef>
+                <a:spcPts val="0"/>
+              </a:spcBef>
+              <a:defRPr/>
+            </a:lvl9pPr>
+          </a:lstStyle>
+          <a:p>
+            <a:r>
+              <a:rPr lang="en-US" smtClean="0"/>
+              <a:t>Click to edit Master title style</a:t>
+            </a:r>
+            <a:endParaRPr/>
+          </a:p>
+        </p:txBody>
+      </p:sp>
+      <p:sp>
+        <p:nvSpPr>
+          <p:cNvPr id="14" name="Shape 14"/>
+          <p:cNvSpPr txBox="1">
+            <a:spLocks noGrp="1"/>
+          </p:cNvSpPr>
+          <p:nvPr>
+            <p:ph type="body" idx="1"/>
+          </p:nvPr>
+        </p:nvSpPr>
+        <p:spPr>
+          <a:xfrm>
+            <a:off x="72701" y="942632"/>
+            <a:ext cx="8951100" cy="5625360"/>
+          </a:xfrm>
+          <a:prstGeom prst="rect">
+            <a:avLst/>
+          </a:prstGeom>
+        </p:spPr>
+        <p:txBody>
+          <a:bodyPr lIns="91425" tIns="91425" rIns="91425" bIns="91425" anchor="t" anchorCtr="0"/>
+          <a:lstStyle>
+            <a:lvl1pPr>
+              <a:spcBef>
+                <a:spcPts val="0"/>
+              </a:spcBef>
+              <a:buSzPct val="100000"/>
+              <a:defRPr sz="2000"/>
+            </a:lvl1pPr>
+            <a:lvl2pPr>
+              <a:spcBef>
+                <a:spcPts val="0"/>
+              </a:spcBef>
+              <a:buSzPct val="100000"/>
+              <a:defRPr sz="1800"/>
+            </a:lvl2pPr>
+            <a:lvl3pPr>
+              <a:spcBef>
+                <a:spcPts val="0"/>
+              </a:spcBef>
+              <a:buSzPct val="100000"/>
+              <a:defRPr sz="1600"/>
+            </a:lvl3pPr>
+            <a:lvl4pPr>
+              <a:spcBef>
+                <a:spcPts val="0"/>
+              </a:spcBef>
+              <a:buSzPct val="100000"/>
+              <a:defRPr sz="1400"/>
+            </a:lvl4pPr>
+            <a:lvl5pPr>
+              <a:spcBef>
+                <a:spcPts val="0"/>
+              </a:spcBef>
+              <a:buSzPct val="100000"/>
+              <a:defRPr sz="1200"/>
+            </a:lvl5pPr>
+            <a:lvl6pPr>
+              <a:spcBef>
+                <a:spcPts val="0"/>
+              </a:spcBef>
+              <a:buSzPct val="100000"/>
+              <a:defRPr sz="1000"/>
+            </a:lvl6pPr>
+            <a:lvl7pPr>
+              <a:spcBef>
+                <a:spcPts val="0"/>
+              </a:spcBef>
+              <a:buSzPct val="100000"/>
+              <a:defRPr sz="1000"/>
+            </a:lvl7pPr>
+            <a:lvl8pPr>
+              <a:spcBef>
+                <a:spcPts val="0"/>
+              </a:spcBef>
+              <a:buSzPct val="100000"/>
+              <a:defRPr sz="1000"/>
+            </a:lvl8pPr>
+            <a:lvl9pPr>
+              <a:spcBef>
+                <a:spcPts val="0"/>
+              </a:spcBef>
+              <a:buSzPct val="100000"/>
+              <a:defRPr sz="800"/>
+            </a:lvl9pPr>
+          </a:lstStyle>
+          <a:p>
+            <a:pPr lvl="0"/>
+            <a:r>
+              <a:rPr lang="en-US" smtClean="0"/>
+              <a:t>Click to edit Master text styles</a:t>
+            </a:r>
+          </a:p>
+        </p:txBody>
+      </p:sp>
+      <p:sp>
+        <p:nvSpPr>
+          <p:cNvPr id="15" name="Shape 15"/>
+          <p:cNvSpPr txBox="1">
+            <a:spLocks noGrp="1"/>
+          </p:cNvSpPr>
+          <p:nvPr>
+            <p:ph type="sldNum" idx="12"/>
+          </p:nvPr>
+        </p:nvSpPr>
+        <p:spPr>
+          <a:xfrm>
+            <a:off x="8556793" y="6333137"/>
+            <a:ext cx="548699" cy="524519"/>
+          </a:xfrm>
+          <a:prstGeom prst="rect">
+            <a:avLst/>
+          </a:prstGeom>
+        </p:spPr>
+        <p:txBody>
+          <a:bodyPr lIns="91425" tIns="91425" rIns="91425" bIns="91425" anchor="ctr" anchorCtr="0">
+            <a:noAutofit/>
+          </a:bodyPr>
+          <a:lstStyle>
+            <a:lvl1pPr>
+              <a:spcBef>
+                <a:spcPts val="0"/>
+              </a:spcBef>
+              <a:buNone/>
+              <a:defRPr/>
+            </a:lvl1pPr>
+          </a:lstStyle>
+          <a:p>
+            <a:fld id="{B6F15528-21DE-4FAA-801E-634DDDAF4B2B}" type="slidenum">
+              <a:rPr lang="en-US" smtClean="0"/>
+              <a:pPr/>
+              <a:t>‹#›</a:t>
+            </a:fld>
+            <a:endParaRPr lang="en-US"/>
+          </a:p>
+        </p:txBody>
+      </p:sp>
+      <p:sp>
+        <p:nvSpPr>
+          <p:cNvPr id="7" name="Rectangle 6"/>
+          <p:cNvSpPr/>
+          <p:nvPr/>
+        </p:nvSpPr>
+        <p:spPr>
+          <a:xfrm>
+            <a:off x="9036498" y="0"/>
+            <a:ext cx="107503" cy="6858000"/>
+          </a:xfrm>
+          <a:prstGeom prst="rect">
+            <a:avLst/>
+          </a:prstGeom>
+          <a:gradFill>
+            <a:gsLst>
+              <a:gs pos="0">
+                <a:schemeClr val="accent6">
+                  <a:lumMod val="75000"/>
+                </a:schemeClr>
+              </a:gs>
+              <a:gs pos="50000">
+                <a:schemeClr val="accent6">
+                  <a:lumMod val="60000"/>
+                  <a:lumOff val="40000"/>
+                </a:schemeClr>
+              </a:gs>
+              <a:gs pos="100000">
+                <a:schemeClr val="accent6">
+                  <a:lumMod val="40000"/>
+                  <a:lumOff val="60000"/>
+                  <a:alpha val="69000"/>
+                </a:schemeClr>
+              </a:gs>
+            </a:gsLst>
+            <a:lin ang="5400000" scaled="0"/>
+          </a:gradFill>
+          <a:ln>
+            <a:noFill/>
+          </a:ln>
+        </p:spPr>
+        <p:style>
+          <a:lnRef idx="2">
+            <a:schemeClr val="accent1">
+              <a:shade val="50000"/>
+            </a:schemeClr>
+          </a:lnRef>
+          <a:fillRef idx="1">
+            <a:schemeClr val="accent1"/>
+          </a:fillRef>
+          <a:effectRef idx="0">
+            <a:schemeClr val="accent1"/>
+          </a:effectRef>
+          <a:fontRef idx="minor">
+            <a:schemeClr val="lt1"/>
+          </a:fontRef>
+        </p:style>
+        <p:txBody>
+          <a:bodyPr rtlCol="0" anchor="ctr"/>
+          <a:lstStyle/>
+          <a:p>
+            <a:pPr algn="ctr"/>
+            <a:endParaRPr lang="en-IN" sz="1167"/>
+          </a:p>
+        </p:txBody>
+      </p:sp>
+      <p:sp>
+        <p:nvSpPr>
+          <p:cNvPr id="8" name="Rectangle 7"/>
+          <p:cNvSpPr/>
+          <p:nvPr/>
+        </p:nvSpPr>
+        <p:spPr>
+          <a:xfrm rot="10800000" flipV="1">
+            <a:off x="107507" y="881187"/>
+            <a:ext cx="8928991" cy="61780"/>
+          </a:xfrm>
+          <a:prstGeom prst="rect">
+            <a:avLst/>
+          </a:prstGeom>
+          <a:gradFill flip="none" rotWithShape="1">
+            <a:gsLst>
+              <a:gs pos="0">
+                <a:schemeClr val="accent6">
+                  <a:lumMod val="75000"/>
+                </a:schemeClr>
+              </a:gs>
+              <a:gs pos="50000">
+                <a:schemeClr val="accent6">
+                  <a:lumMod val="60000"/>
+                  <a:lumOff val="40000"/>
+                </a:schemeClr>
+              </a:gs>
+              <a:gs pos="100000">
+                <a:schemeClr val="accent6">
+                  <a:lumMod val="40000"/>
+                  <a:lumOff val="60000"/>
+                  <a:alpha val="0"/>
+                </a:schemeClr>
+              </a:gs>
+            </a:gsLst>
+            <a:lin ang="0" scaled="1"/>
+            <a:tileRect/>
+          </a:gradFill>
+          <a:ln>
+            <a:noFill/>
+          </a:ln>
+        </p:spPr>
+        <p:style>
+          <a:lnRef idx="2">
+            <a:schemeClr val="accent1">
+              <a:shade val="50000"/>
+            </a:schemeClr>
+          </a:lnRef>
+          <a:fillRef idx="1">
+            <a:schemeClr val="accent1"/>
+          </a:fillRef>
+          <a:effectRef idx="0">
+            <a:schemeClr val="accent1"/>
+          </a:effectRef>
+          <a:fontRef idx="minor">
+            <a:schemeClr val="lt1"/>
+          </a:fontRef>
+        </p:style>
+        <p:txBody>
+          <a:bodyPr rtlCol="0" anchor="ctr"/>
+          <a:lstStyle/>
+          <a:p>
+            <a:pPr algn="ctr"/>
+            <a:endParaRPr lang="en-IN" sz="1800"/>
+          </a:p>
+        </p:txBody>
+      </p:sp>
+    </p:spTree>
+    <p:extLst>
+      <p:ext uri="{BB962C8B-B14F-4D97-AF65-F5344CB8AC3E}">
+        <p14:creationId xmlns:p14="http://schemas.microsoft.com/office/powerpoint/2010/main" val="556707205"/>
+      </p:ext>
+    </p:extLst>
   </p:cSld>
   <p:clrMapOvr>
     <a:masterClrMapping/>
@@ -1507,7 +1997,7 @@
               <a:rPr lang="en-US" smtClean="0"/>
               <a:t>Click to edit Master title style</a:t>
             </a:r>
-            <a:endParaRPr lang="en-US"/>
+            <a:endParaRPr lang="en-IN"/>
           </a:p>
         </p:txBody>
       </p:sp>
@@ -1521,7 +2011,12 @@
             <p:ph idx="1"/>
           </p:nvPr>
         </p:nvSpPr>
-        <p:spPr/>
+        <p:spPr>
+          <a:xfrm>
+            <a:off x="107505" y="764704"/>
+            <a:ext cx="8928992" cy="5544616"/>
+          </a:xfrm>
+        </p:spPr>
         <p:txBody>
           <a:bodyPr/>
           <a:lstStyle/>
@@ -1559,7 +2054,7 @@
               <a:rPr lang="en-US" smtClean="0"/>
               <a:t>Fifth level</a:t>
             </a:r>
-            <a:endParaRPr lang="en-US"/>
+            <a:endParaRPr lang="en-IN" dirty="0"/>
           </a:p>
         </p:txBody>
       </p:sp>
@@ -1573,7 +2068,12 @@
             <p:ph type="dt" sz="half" idx="10"/>
           </p:nvPr>
         </p:nvSpPr>
-        <p:spPr/>
+        <p:spPr>
+          <a:xfrm>
+            <a:off x="87200" y="6469087"/>
+            <a:ext cx="2133600" cy="365125"/>
+          </a:xfrm>
+        </p:spPr>
         <p:txBody>
           <a:bodyPr/>
           <a:lstStyle/>
@@ -1581,7 +2081,7 @@
             <a:fld id="{1D8BD707-D9CF-40AE-B4C6-C98DA3205C09}" type="datetimeFigureOut">
               <a:rPr lang="en-US" smtClean="0"/>
               <a:pPr/>
-              <a:t>8/7/2015</a:t>
+              <a:t>8/7/15</a:t>
             </a:fld>
             <a:endParaRPr lang="en-US"/>
           </a:p>
@@ -1597,7 +2097,12 @@
             <p:ph type="ftr" sz="quarter" idx="11"/>
           </p:nvPr>
         </p:nvSpPr>
-        <p:spPr/>
+        <p:spPr>
+          <a:xfrm>
+            <a:off x="3170450" y="6469087"/>
+            <a:ext cx="2895600" cy="365125"/>
+          </a:xfrm>
+        </p:spPr>
         <p:txBody>
           <a:bodyPr/>
           <a:lstStyle/>
@@ -1616,7 +2121,12 @@
             <p:ph type="sldNum" sz="quarter" idx="12"/>
           </p:nvPr>
         </p:nvSpPr>
-        <p:spPr/>
+        <p:spPr>
+          <a:xfrm>
+            <a:off x="6883400" y="6480350"/>
+            <a:ext cx="2133600" cy="365125"/>
+          </a:xfrm>
+        </p:spPr>
         <p:txBody>
           <a:bodyPr/>
           <a:lstStyle/>
@@ -1630,7 +2140,145 @@
           </a:p>
         </p:txBody>
       </p:sp>
+      <p:sp>
+        <p:nvSpPr>
+          <p:cNvPr id="8" name="Rectangle 7"/>
+          <p:cNvSpPr/>
+          <p:nvPr/>
+        </p:nvSpPr>
+        <p:spPr>
+          <a:xfrm>
+            <a:off x="9036498" y="0"/>
+            <a:ext cx="107503" cy="6858000"/>
+          </a:xfrm>
+          <a:prstGeom prst="rect">
+            <a:avLst/>
+          </a:prstGeom>
+          <a:gradFill>
+            <a:gsLst>
+              <a:gs pos="0">
+                <a:schemeClr val="accent6">
+                  <a:lumMod val="75000"/>
+                </a:schemeClr>
+              </a:gs>
+              <a:gs pos="50000">
+                <a:schemeClr val="accent6">
+                  <a:lumMod val="60000"/>
+                  <a:lumOff val="40000"/>
+                </a:schemeClr>
+              </a:gs>
+              <a:gs pos="100000">
+                <a:schemeClr val="accent6">
+                  <a:lumMod val="40000"/>
+                  <a:lumOff val="60000"/>
+                  <a:alpha val="69000"/>
+                </a:schemeClr>
+              </a:gs>
+            </a:gsLst>
+            <a:lin ang="5400000" scaled="0"/>
+          </a:gradFill>
+          <a:ln>
+            <a:noFill/>
+          </a:ln>
+        </p:spPr>
+        <p:style>
+          <a:lnRef idx="2">
+            <a:schemeClr val="accent1">
+              <a:shade val="50000"/>
+            </a:schemeClr>
+          </a:lnRef>
+          <a:fillRef idx="1">
+            <a:schemeClr val="accent1"/>
+          </a:fillRef>
+          <a:effectRef idx="0">
+            <a:schemeClr val="accent1"/>
+          </a:effectRef>
+          <a:fontRef idx="minor">
+            <a:schemeClr val="lt1"/>
+          </a:fontRef>
+        </p:style>
+        <p:txBody>
+          <a:bodyPr rtlCol="0" anchor="ctr"/>
+          <a:lstStyle/>
+          <a:p>
+            <a:pPr algn="ctr"/>
+            <a:endParaRPr lang="en-IN" sz="1167"/>
+          </a:p>
+        </p:txBody>
+      </p:sp>
+      <p:sp>
+        <p:nvSpPr>
+          <p:cNvPr id="9" name="Rectangle 8"/>
+          <p:cNvSpPr/>
+          <p:nvPr/>
+        </p:nvSpPr>
+        <p:spPr>
+          <a:xfrm rot="10800000" flipV="1">
+            <a:off x="107505" y="702924"/>
+            <a:ext cx="8928991" cy="61780"/>
+          </a:xfrm>
+          <a:prstGeom prst="rect">
+            <a:avLst/>
+          </a:prstGeom>
+          <a:gradFill flip="none" rotWithShape="1">
+            <a:gsLst>
+              <a:gs pos="0">
+                <a:schemeClr val="accent6">
+                  <a:lumMod val="75000"/>
+                </a:schemeClr>
+              </a:gs>
+              <a:gs pos="50000">
+                <a:schemeClr val="accent6">
+                  <a:lumMod val="60000"/>
+                  <a:lumOff val="40000"/>
+                </a:schemeClr>
+              </a:gs>
+              <a:gs pos="100000">
+                <a:schemeClr val="accent6">
+                  <a:lumMod val="40000"/>
+                  <a:lumOff val="60000"/>
+                  <a:alpha val="0"/>
+                </a:schemeClr>
+              </a:gs>
+            </a:gsLst>
+            <a:lin ang="0" scaled="1"/>
+            <a:tileRect/>
+          </a:gradFill>
+          <a:ln>
+            <a:noFill/>
+          </a:ln>
+        </p:spPr>
+        <p:style>
+          <a:lnRef idx="2">
+            <a:schemeClr val="accent1">
+              <a:shade val="50000"/>
+            </a:schemeClr>
+          </a:lnRef>
+          <a:fillRef idx="1">
+            <a:schemeClr val="accent1"/>
+          </a:fillRef>
+          <a:effectRef idx="0">
+            <a:schemeClr val="accent1"/>
+          </a:effectRef>
+          <a:fontRef idx="minor">
+            <a:schemeClr val="lt1"/>
+          </a:fontRef>
+        </p:style>
+        <p:txBody>
+          <a:bodyPr rtlCol="0" anchor="ctr"/>
+          <a:lstStyle/>
+          <a:p>
+            <a:pPr algn="ctr"/>
+            <a:endParaRPr lang="en-IN" sz="1800"/>
+          </a:p>
+        </p:txBody>
+      </p:sp>
     </p:spTree>
+    <p:extLst>
+      <p:ext uri="{BB962C8B-B14F-4D97-AF65-F5344CB8AC3E}">
+        <p14:creationId xmlns:p14="http://schemas.microsoft.com/office/powerpoint/2010/main" val="992277052"/>
+      </p:ext>
+    </p:extLst>
   </p:cSld>
   <p:clrMapOvr>
     <a:masterClrMapping/>
@@ -1667,15 +2315,15 @@
         </p:nvSpPr>
         <p:spPr>
           <a:xfrm>
-            <a:off x="722313" y="4406900"/>
-            <a:ext cx="7772400" cy="1362075"/>
+            <a:off x="722313" y="4406902"/>
+            <a:ext cx="7772400" cy="1362076"/>
           </a:xfrm>
         </p:spPr>
         <p:txBody>
           <a:bodyPr anchor="t"/>
           <a:lstStyle>
             <a:lvl1pPr algn="l">
-              <a:defRPr sz="4000" b="1" cap="all"/>
+              <a:defRPr sz="3333" b="1" cap="all"/>
             </a:lvl1pPr>
           </a:lstStyle>
           <a:p>
@@ -1683,7 +2331,7 @@
               <a:rPr lang="en-US" smtClean="0"/>
               <a:t>Click to edit Master title style</a:t>
             </a:r>
-            <a:endParaRPr lang="en-US"/>
+            <a:endParaRPr lang="en-IN"/>
           </a:p>
         </p:txBody>
       </p:sp>
@@ -1708,7 +2356,7 @@
           <a:lstStyle>
             <a:lvl1pPr marL="0" indent="0">
               <a:buNone/>
-              <a:defRPr sz="2000">
+              <a:defRPr sz="1667">
                 <a:solidFill>
                   <a:schemeClr val="tx1">
                     <a:tint val="75000"/>
@@ -1716,9 +2364,9 @@
                 </a:solidFill>
               </a:defRPr>
             </a:lvl1pPr>
-            <a:lvl2pPr marL="457200" indent="0">
+            <a:lvl2pPr marL="380985" indent="0">
               <a:buNone/>
-              <a:defRPr sz="1800">
+              <a:defRPr sz="1500">
                 <a:solidFill>
                   <a:schemeClr val="tx1">
                     <a:tint val="75000"/>
@@ -1726,9 +2374,9 @@
                 </a:solidFill>
               </a:defRPr>
             </a:lvl2pPr>
-            <a:lvl3pPr marL="914400" indent="0">
+            <a:lvl3pPr marL="761970" indent="0">
               <a:buNone/>
-              <a:defRPr sz="1600">
+              <a:defRPr sz="1333">
                 <a:solidFill>
                   <a:schemeClr val="tx1">
                     <a:tint val="75000"/>
@@ -1736,9 +2384,9 @@
                 </a:solidFill>
               </a:defRPr>
             </a:lvl3pPr>
-            <a:lvl4pPr marL="1371600" indent="0">
+            <a:lvl4pPr marL="1142954" indent="0">
               <a:buNone/>
-              <a:defRPr sz="1400">
+              <a:defRPr sz="1167">
                 <a:solidFill>
                   <a:schemeClr val="tx1">
                     <a:tint val="75000"/>
@@ -1746,9 +2394,9 @@
                 </a:solidFill>
               </a:defRPr>
             </a:lvl4pPr>
-            <a:lvl5pPr marL="1828800" indent="0">
+            <a:lvl5pPr marL="1523939" indent="0">
               <a:buNone/>
-              <a:defRPr sz="1400">
+              <a:defRPr sz="1167">
                 <a:solidFill>
                   <a:schemeClr val="tx1">
                     <a:tint val="75000"/>
@@ -1756,9 +2404,9 @@
                 </a:solidFill>
               </a:defRPr>
             </a:lvl5pPr>
-            <a:lvl6pPr marL="2286000" indent="0">
+            <a:lvl6pPr marL="1904924" indent="0">
               <a:buNone/>
-              <a:defRPr sz="1400">
+              <a:defRPr sz="1167">
                 <a:solidFill>
                   <a:schemeClr val="tx1">
                     <a:tint val="75000"/>
@@ -1766,9 +2414,9 @@
                 </a:solidFill>
               </a:defRPr>
             </a:lvl6pPr>
-            <a:lvl7pPr marL="2743200" indent="0">
+            <a:lvl7pPr marL="2285909" indent="0">
               <a:buNone/>
-              <a:defRPr sz="1400">
+              <a:defRPr sz="1167">
                 <a:solidFill>
                   <a:schemeClr val="tx1">
                     <a:tint val="75000"/>
@@ -1776,9 +2424,9 @@
                 </a:solidFill>
               </a:defRPr>
             </a:lvl7pPr>
-            <a:lvl8pPr marL="3200400" indent="0">
+            <a:lvl8pPr marL="2666893" indent="0">
               <a:buNone/>
-              <a:defRPr sz="1400">
+              <a:defRPr sz="1167">
                 <a:solidFill>
                   <a:schemeClr val="tx1">
                     <a:tint val="75000"/>
@@ -1786,9 +2434,9 @@
                 </a:solidFill>
               </a:defRPr>
             </a:lvl8pPr>
-            <a:lvl9pPr marL="3657600" indent="0">
+            <a:lvl9pPr marL="3047878" indent="0">
               <a:buNone/>
-              <a:defRPr sz="1400">
+              <a:defRPr sz="1167">
                 <a:solidFill>
                   <a:schemeClr val="tx1">
                     <a:tint val="75000"/>
@@ -1824,7 +2472,7 @@
             <a:fld id="{1D8BD707-D9CF-40AE-B4C6-C98DA3205C09}" type="datetimeFigureOut">
               <a:rPr lang="en-US" smtClean="0"/>
               <a:pPr/>
-              <a:t>8/7/2015</a:t>
+              <a:t>8/7/15</a:t>
             </a:fld>
             <a:endParaRPr lang="en-US"/>
           </a:p>
@@ -1873,7 +2521,78 @@
           </a:p>
         </p:txBody>
       </p:sp>
+      <p:sp>
+        <p:nvSpPr>
+          <p:cNvPr id="7" name="Rectangle 6"/>
+          <p:cNvSpPr/>
+          <p:nvPr/>
+        </p:nvSpPr>
+        <p:spPr>
+          <a:xfrm>
+            <a:off x="9036498" y="0"/>
+            <a:ext cx="107503" cy="6858000"/>
+          </a:xfrm>
+          <a:prstGeom prst="rect">
+            <a:avLst/>
+          </a:prstGeom>
+          <a:gradFill>
+            <a:gsLst>
+              <a:gs pos="0">
+                <a:schemeClr val="accent6">
+                  <a:lumMod val="75000"/>
+                </a:schemeClr>
+              </a:gs>
+              <a:gs pos="50000">
+                <a:schemeClr val="accent6">
+                  <a:lumMod val="60000"/>
+                  <a:lumOff val="40000"/>
+                </a:schemeClr>
+              </a:gs>
+              <a:gs pos="100000">
+                <a:schemeClr val="accent6">
+                  <a:lumMod val="40000"/>
+                  <a:lumOff val="60000"/>
+                  <a:alpha val="69000"/>
+                </a:schemeClr>
+              </a:gs>
+            </a:gsLst>
+            <a:lin ang="5400000" scaled="0"/>
+          </a:gradFill>
+          <a:ln>
+            <a:noFill/>
+          </a:ln>
+        </p:spPr>
+        <p:style>
+          <a:lnRef idx="2">
+            <a:schemeClr val="accent1">
+              <a:shade val="50000"/>
+            </a:schemeClr>
+          </a:lnRef>
+          <a:fillRef idx="1">
+            <a:schemeClr val="accent1"/>
+          </a:fillRef>
+          <a:effectRef idx="0">
+            <a:schemeClr val="accent1"/>
+          </a:effectRef>
+          <a:fontRef idx="minor">
+            <a:schemeClr val="lt1"/>
+          </a:fontRef>
+        </p:style>
+        <p:txBody>
+          <a:bodyPr rtlCol="0" anchor="ctr"/>
+          <a:lstStyle/>
+          <a:p>
+            <a:pPr algn="ctr"/>
+            <a:endParaRPr lang="en-IN" sz="1167"/>
+          </a:p>
+        </p:txBody>
+      </p:sp>
     </p:spTree>
+    <p:extLst>
+      <p:ext uri="{BB962C8B-B14F-4D97-AF65-F5344CB8AC3E}">
+        <p14:creationId xmlns:p14="http://schemas.microsoft.com/office/powerpoint/2010/main" val="284665220"/>
+      </p:ext>
+    </p:extLst>
   </p:cSld>
   <p:clrMapOvr>
     <a:masterClrMapping/>
@@ -1917,7 +2636,7 @@
               <a:rPr lang="en-US" smtClean="0"/>
               <a:t>Click to edit Master title style</a:t>
             </a:r>
-            <a:endParaRPr lang="en-US"/>
+            <a:endParaRPr lang="en-IN"/>
           </a:p>
         </p:txBody>
       </p:sp>
@@ -1933,7 +2652,7 @@
         </p:nvSpPr>
         <p:spPr>
           <a:xfrm>
-            <a:off x="457200" y="1600200"/>
+            <a:off x="457200" y="1600201"/>
             <a:ext cx="4038600" cy="4525963"/>
           </a:xfrm>
         </p:spPr>
@@ -1941,31 +2660,31 @@
           <a:bodyPr/>
           <a:lstStyle>
             <a:lvl1pPr>
-              <a:defRPr sz="2800"/>
+              <a:defRPr sz="2333"/>
             </a:lvl1pPr>
             <a:lvl2pPr>
-              <a:defRPr sz="2400"/>
+              <a:defRPr sz="2000"/>
             </a:lvl2pPr>
             <a:lvl3pPr>
-              <a:defRPr sz="2000"/>
+              <a:defRPr sz="1667"/>
             </a:lvl3pPr>
             <a:lvl4pPr>
-              <a:defRPr sz="1800"/>
+              <a:defRPr sz="1500"/>
             </a:lvl4pPr>
             <a:lvl5pPr>
-              <a:defRPr sz="1800"/>
+              <a:defRPr sz="1500"/>
             </a:lvl5pPr>
             <a:lvl6pPr>
-              <a:defRPr sz="1800"/>
+              <a:defRPr sz="1500"/>
             </a:lvl6pPr>
             <a:lvl7pPr>
-              <a:defRPr sz="1800"/>
+              <a:defRPr sz="1500"/>
             </a:lvl7pPr>
             <a:lvl8pPr>
-              <a:defRPr sz="1800"/>
+              <a:defRPr sz="1500"/>
             </a:lvl8pPr>
             <a:lvl9pPr>
-              <a:defRPr sz="1800"/>
+              <a:defRPr sz="1500"/>
             </a:lvl9pPr>
           </a:lstStyle>
           <a:p>
@@ -2002,7 +2721,7 @@
               <a:rPr lang="en-US" smtClean="0"/>
               <a:t>Fifth level</a:t>
             </a:r>
-            <a:endParaRPr lang="en-US"/>
+            <a:endParaRPr lang="en-IN"/>
           </a:p>
         </p:txBody>
       </p:sp>
@@ -2018,7 +2737,7 @@
         </p:nvSpPr>
         <p:spPr>
           <a:xfrm>
-            <a:off x="4648200" y="1600200"/>
+            <a:off x="4648200" y="1600201"/>
             <a:ext cx="4038600" cy="4525963"/>
           </a:xfrm>
         </p:spPr>
@@ -2026,31 +2745,31 @@
           <a:bodyPr/>
           <a:lstStyle>
             <a:lvl1pPr>
-              <a:defRPr sz="2800"/>
+              <a:defRPr sz="2333"/>
             </a:lvl1pPr>
             <a:lvl2pPr>
-              <a:defRPr sz="2400"/>
+              <a:defRPr sz="2000"/>
             </a:lvl2pPr>
             <a:lvl3pPr>
-              <a:defRPr sz="2000"/>
+              <a:defRPr sz="1667"/>
             </a:lvl3pPr>
             <a:lvl4pPr>
-              <a:defRPr sz="1800"/>
+              <a:defRPr sz="1500"/>
             </a:lvl4pPr>
             <a:lvl5pPr>
-              <a:defRPr sz="1800"/>
+              <a:defRPr sz="1500"/>
             </a:lvl5pPr>
             <a:lvl6pPr>
-              <a:defRPr sz="1800"/>
+              <a:defRPr sz="1500"/>
             </a:lvl6pPr>
             <a:lvl7pPr>
-              <a:defRPr sz="1800"/>
+              <a:defRPr sz="1500"/>
             </a:lvl7pPr>
             <a:lvl8pPr>
-              <a:defRPr sz="1800"/>
+              <a:defRPr sz="1500"/>
             </a:lvl8pPr>
             <a:lvl9pPr>
-              <a:defRPr sz="1800"/>
+              <a:defRPr sz="1500"/>
             </a:lvl9pPr>
           </a:lstStyle>
           <a:p>
@@ -2087,7 +2806,7 @@
               <a:rPr lang="en-US" smtClean="0"/>
               <a:t>Fifth level</a:t>
             </a:r>
-            <a:endParaRPr lang="en-US"/>
+            <a:endParaRPr lang="en-IN"/>
           </a:p>
         </p:txBody>
       </p:sp>
@@ -2109,7 +2828,7 @@
             <a:fld id="{1D8BD707-D9CF-40AE-B4C6-C98DA3205C09}" type="datetimeFigureOut">
               <a:rPr lang="en-US" smtClean="0"/>
               <a:pPr/>
-              <a:t>8/7/2015</a:t>
+              <a:t>8/7/15</a:t>
             </a:fld>
             <a:endParaRPr lang="en-US"/>
           </a:p>
@@ -2158,7 +2877,145 @@
           </a:p>
         </p:txBody>
       </p:sp>
+      <p:sp>
+        <p:nvSpPr>
+          <p:cNvPr id="8" name="Rectangle 7"/>
+          <p:cNvSpPr/>
+          <p:nvPr/>
+        </p:nvSpPr>
+        <p:spPr>
+          <a:xfrm>
+            <a:off x="9036498" y="0"/>
+            <a:ext cx="107503" cy="6858000"/>
+          </a:xfrm>
+          <a:prstGeom prst="rect">
+            <a:avLst/>
+          </a:prstGeom>
+          <a:gradFill>
+            <a:gsLst>
+              <a:gs pos="0">
+                <a:schemeClr val="accent6">
+                  <a:lumMod val="75000"/>
+                </a:schemeClr>
+              </a:gs>
+              <a:gs pos="50000">
+                <a:schemeClr val="accent6">
+                  <a:lumMod val="60000"/>
+                  <a:lumOff val="40000"/>
+                </a:schemeClr>
+              </a:gs>
+              <a:gs pos="100000">
+                <a:schemeClr val="accent6">
+                  <a:lumMod val="40000"/>
+                  <a:lumOff val="60000"/>
+                  <a:alpha val="69000"/>
+                </a:schemeClr>
+              </a:gs>
+            </a:gsLst>
+            <a:lin ang="5400000" scaled="0"/>
+          </a:gradFill>
+          <a:ln>
+            <a:noFill/>
+          </a:ln>
+        </p:spPr>
+        <p:style>
+          <a:lnRef idx="2">
+            <a:schemeClr val="accent1">
+              <a:shade val="50000"/>
+            </a:schemeClr>
+          </a:lnRef>
+          <a:fillRef idx="1">
+            <a:schemeClr val="accent1"/>
+          </a:fillRef>
+          <a:effectRef idx="0">
+            <a:schemeClr val="accent1"/>
+          </a:effectRef>
+          <a:fontRef idx="minor">
+            <a:schemeClr val="lt1"/>
+          </a:fontRef>
+        </p:style>
+        <p:txBody>
+          <a:bodyPr rtlCol="0" anchor="ctr"/>
+          <a:lstStyle/>
+          <a:p>
+            <a:pPr algn="ctr"/>
+            <a:endParaRPr lang="en-IN" sz="1167"/>
+          </a:p>
+        </p:txBody>
+      </p:sp>
+      <p:sp>
+        <p:nvSpPr>
+          <p:cNvPr id="9" name="Rectangle 8"/>
+          <p:cNvSpPr/>
+          <p:nvPr/>
+        </p:nvSpPr>
+        <p:spPr>
+          <a:xfrm rot="10800000" flipV="1">
+            <a:off x="107505" y="702924"/>
+            <a:ext cx="8928991" cy="61780"/>
+          </a:xfrm>
+          <a:prstGeom prst="rect">
+            <a:avLst/>
+          </a:prstGeom>
+          <a:gradFill flip="none" rotWithShape="1">
+            <a:gsLst>
+              <a:gs pos="0">
+                <a:schemeClr val="accent6">
+                  <a:lumMod val="75000"/>
+                </a:schemeClr>
+              </a:gs>
+              <a:gs pos="50000">
+                <a:schemeClr val="accent6">
+                  <a:lumMod val="60000"/>
+                  <a:lumOff val="40000"/>
+                </a:schemeClr>
+              </a:gs>
+              <a:gs pos="100000">
+                <a:schemeClr val="accent6">
+                  <a:lumMod val="40000"/>
+                  <a:lumOff val="60000"/>
+                  <a:alpha val="0"/>
+                </a:schemeClr>
+              </a:gs>
+            </a:gsLst>
+            <a:lin ang="0" scaled="1"/>
+            <a:tileRect/>
+          </a:gradFill>
+          <a:ln>
+            <a:noFill/>
+          </a:ln>
+        </p:spPr>
+        <p:style>
+          <a:lnRef idx="2">
+            <a:schemeClr val="accent1">
+              <a:shade val="50000"/>
+            </a:schemeClr>
+          </a:lnRef>
+          <a:fillRef idx="1">
+            <a:schemeClr val="accent1"/>
+          </a:fillRef>
+          <a:effectRef idx="0">
+            <a:schemeClr val="accent1"/>
+          </a:effectRef>
+          <a:fontRef idx="minor">
+            <a:schemeClr val="lt1"/>
+          </a:fontRef>
+        </p:style>
+        <p:txBody>
+          <a:bodyPr rtlCol="0" anchor="ctr"/>
+          <a:lstStyle/>
+          <a:p>
+            <a:pPr algn="ctr"/>
+            <a:endParaRPr lang="en-IN" sz="1800"/>
+          </a:p>
+        </p:txBody>
+      </p:sp>
     </p:spTree>
+    <p:extLst>
+      <p:ext uri="{BB962C8B-B14F-4D97-AF65-F5344CB8AC3E}">
+        <p14:creationId xmlns:p14="http://schemas.microsoft.com/office/powerpoint/2010/main" val="1998562957"/>
+      </p:ext>
+    </p:extLst>
   </p:cSld>
   <p:clrMapOvr>
     <a:masterClrMapping/>
@@ -2206,7 +3063,7 @@
               <a:rPr lang="en-US" smtClean="0"/>
               <a:t>Click to edit Master title style</a:t>
             </a:r>
-            <a:endParaRPr lang="en-US"/>
+            <a:endParaRPr lang="en-IN"/>
           </a:p>
         </p:txBody>
       </p:sp>
@@ -2222,7 +3079,7 @@
         </p:nvSpPr>
         <p:spPr>
           <a:xfrm>
-            <a:off x="457200" y="1535113"/>
+            <a:off x="457200" y="1535114"/>
             <a:ext cx="4040188" cy="639762"/>
           </a:xfrm>
         </p:spPr>
@@ -2231,39 +3088,39 @@
           <a:lstStyle>
             <a:lvl1pPr marL="0" indent="0">
               <a:buNone/>
-              <a:defRPr sz="2400" b="1"/>
+              <a:defRPr sz="2000" b="1"/>
             </a:lvl1pPr>
-            <a:lvl2pPr marL="457200" indent="0">
+            <a:lvl2pPr marL="380985" indent="0">
               <a:buNone/>
-              <a:defRPr sz="2000" b="1"/>
+              <a:defRPr sz="1667" b="1"/>
             </a:lvl2pPr>
-            <a:lvl3pPr marL="914400" indent="0">
+            <a:lvl3pPr marL="761970" indent="0">
               <a:buNone/>
-              <a:defRPr sz="1800" b="1"/>
+              <a:defRPr sz="1500" b="1"/>
             </a:lvl3pPr>
-            <a:lvl4pPr marL="1371600" indent="0">
+            <a:lvl4pPr marL="1142954" indent="0">
               <a:buNone/>
-              <a:defRPr sz="1600" b="1"/>
+              <a:defRPr sz="1333" b="1"/>
             </a:lvl4pPr>
-            <a:lvl5pPr marL="1828800" indent="0">
+            <a:lvl5pPr marL="1523939" indent="0">
               <a:buNone/>
-              <a:defRPr sz="1600" b="1"/>
+              <a:defRPr sz="1333" b="1"/>
             </a:lvl5pPr>
-            <a:lvl6pPr marL="2286000" indent="0">
+            <a:lvl6pPr marL="1904924" indent="0">
               <a:buNone/>
-              <a:defRPr sz="1600" b="1"/>
+              <a:defRPr sz="1333" b="1"/>
             </a:lvl6pPr>
-            <a:lvl7pPr marL="2743200" indent="0">
+            <a:lvl7pPr marL="2285909" indent="0">
               <a:buNone/>
-              <a:defRPr sz="1600" b="1"/>
+              <a:defRPr sz="1333" b="1"/>
             </a:lvl7pPr>
-            <a:lvl8pPr marL="3200400" indent="0">
+            <a:lvl8pPr marL="2666893" indent="0">
               <a:buNone/>
-              <a:defRPr sz="1600" b="1"/>
+              <a:defRPr sz="1333" b="1"/>
             </a:lvl8pPr>
-            <a:lvl9pPr marL="3657600" indent="0">
+            <a:lvl9pPr marL="3047878" indent="0">
               <a:buNone/>
-              <a:defRPr sz="1600" b="1"/>
+              <a:defRPr sz="1333" b="1"/>
             </a:lvl9pPr>
           </a:lstStyle>
           <a:p>
@@ -2295,31 +3152,31 @@
           <a:bodyPr/>
           <a:lstStyle>
             <a:lvl1pPr>
-              <a:defRPr sz="2400"/>
+              <a:defRPr sz="2000"/>
             </a:lvl1pPr>
             <a:lvl2pPr>
-              <a:defRPr sz="2000"/>
+              <a:defRPr sz="1667"/>
             </a:lvl2pPr>
             <a:lvl3pPr>
-              <a:defRPr sz="1800"/>
+              <a:defRPr sz="1500"/>
             </a:lvl3pPr>
             <a:lvl4pPr>
-              <a:defRPr sz="1600"/>
+              <a:defRPr sz="1333"/>
             </a:lvl4pPr>
             <a:lvl5pPr>
-              <a:defRPr sz="1600"/>
+              <a:defRPr sz="1333"/>
             </a:lvl5pPr>
             <a:lvl6pPr>
-              <a:defRPr sz="1600"/>
+              <a:defRPr sz="1333"/>
             </a:lvl6pPr>
             <a:lvl7pPr>
-              <a:defRPr sz="1600"/>
+              <a:defRPr sz="1333"/>
             </a:lvl7pPr>
             <a:lvl8pPr>
-              <a:defRPr sz="1600"/>
+              <a:defRPr sz="1333"/>
             </a:lvl8pPr>
             <a:lvl9pPr>
-              <a:defRPr sz="1600"/>
+              <a:defRPr sz="1333"/>
             </a:lvl9pPr>
           </a:lstStyle>
           <a:p>
@@ -2356,7 +3213,7 @@
               <a:rPr lang="en-US" smtClean="0"/>
               <a:t>Fifth level</a:t>
             </a:r>
-            <a:endParaRPr lang="en-US"/>
+            <a:endParaRPr lang="en-IN"/>
           </a:p>
         </p:txBody>
       </p:sp>
@@ -2372,7 +3229,7 @@
         </p:nvSpPr>
         <p:spPr>
           <a:xfrm>
-            <a:off x="4645025" y="1535113"/>
+            <a:off x="4645027" y="1535114"/>
             <a:ext cx="4041775" cy="639762"/>
           </a:xfrm>
         </p:spPr>
@@ -2381,39 +3238,39 @@
           <a:lstStyle>
             <a:lvl1pPr marL="0" indent="0">
               <a:buNone/>
-              <a:defRPr sz="2400" b="1"/>
+              <a:defRPr sz="2000" b="1"/>
             </a:lvl1pPr>
-            <a:lvl2pPr marL="457200" indent="0">
+            <a:lvl2pPr marL="380985" indent="0">
               <a:buNone/>
-              <a:defRPr sz="2000" b="1"/>
+              <a:defRPr sz="1667" b="1"/>
             </a:lvl2pPr>
-            <a:lvl3pPr marL="914400" indent="0">
+            <a:lvl3pPr marL="761970" indent="0">
               <a:buNone/>
-              <a:defRPr sz="1800" b="1"/>
+              <a:defRPr sz="1500" b="1"/>
             </a:lvl3pPr>
-            <a:lvl4pPr marL="1371600" indent="0">
+            <a:lvl4pPr marL="1142954" indent="0">
               <a:buNone/>
-              <a:defRPr sz="1600" b="1"/>
+              <a:defRPr sz="1333" b="1"/>
             </a:lvl4pPr>
-            <a:lvl5pPr marL="1828800" indent="0">
+            <a:lvl5pPr marL="1523939" indent="0">
               <a:buNone/>
-              <a:defRPr sz="1600" b="1"/>
+              <a:defRPr sz="1333" b="1"/>
             </a:lvl5pPr>
-            <a:lvl6pPr marL="2286000" indent="0">
+            <a:lvl6pPr marL="1904924" indent="0">
               <a:buNone/>
-              <a:defRPr sz="1600" b="1"/>
+              <a:defRPr sz="1333" b="1"/>
             </a:lvl6pPr>
-            <a:lvl7pPr marL="2743200" indent="0">
+            <a:lvl7pPr marL="2285909" indent="0">
               <a:buNone/>
-              <a:defRPr sz="1600" b="1"/>
+              <a:defRPr sz="1333" b="1"/>
             </a:lvl7pPr>
-            <a:lvl8pPr marL="3200400" indent="0">
+            <a:lvl8pPr marL="2666893" indent="0">
               <a:buNone/>
-              <a:defRPr sz="1600" b="1"/>
+              <a:defRPr sz="1333" b="1"/>
             </a:lvl8pPr>
-            <a:lvl9pPr marL="3657600" indent="0">
+            <a:lvl9pPr marL="3047878" indent="0">
               <a:buNone/>
-              <a:defRPr sz="1600" b="1"/>
+              <a:defRPr sz="1333" b="1"/>
             </a:lvl9pPr>
           </a:lstStyle>
           <a:p>
@@ -2437,7 +3294,7 @@
         </p:nvSpPr>
         <p:spPr>
           <a:xfrm>
-            <a:off x="4645025" y="2174875"/>
+            <a:off x="4645027" y="2174875"/>
             <a:ext cx="4041775" cy="3951288"/>
           </a:xfrm>
         </p:spPr>
@@ -2445,31 +3302,31 @@
           <a:bodyPr/>
           <a:lstStyle>
             <a:lvl1pPr>
-              <a:defRPr sz="2400"/>
+              <a:defRPr sz="2000"/>
             </a:lvl1pPr>
             <a:lvl2pPr>
-              <a:defRPr sz="2000"/>
+              <a:defRPr sz="1667"/>
             </a:lvl2pPr>
             <a:lvl3pPr>
-              <a:defRPr sz="1800"/>
+              <a:defRPr sz="1500"/>
             </a:lvl3pPr>
             <a:lvl4pPr>
-              <a:defRPr sz="1600"/>
+              <a:defRPr sz="1333"/>
             </a:lvl4pPr>
             <a:lvl5pPr>
-              <a:defRPr sz="1600"/>
+              <a:defRPr sz="1333"/>
             </a:lvl5pPr>
             <a:lvl6pPr>
-              <a:defRPr sz="1600"/>
+              <a:defRPr sz="1333"/>
             </a:lvl6pPr>
             <a:lvl7pPr>
-              <a:defRPr sz="1600"/>
+              <a:defRPr sz="1333"/>
             </a:lvl7pPr>
             <a:lvl8pPr>
-              <a:defRPr sz="1600"/>
+              <a:defRPr sz="1333"/>
             </a:lvl8pPr>
             <a:lvl9pPr>
-              <a:defRPr sz="1600"/>
+              <a:defRPr sz="1333"/>
             </a:lvl9pPr>
           </a:lstStyle>
           <a:p>
@@ -2506,7 +3363,7 @@
               <a:rPr lang="en-US" smtClean="0"/>
               <a:t>Fifth level</a:t>
             </a:r>
-            <a:endParaRPr lang="en-US"/>
+            <a:endParaRPr lang="en-IN"/>
           </a:p>
         </p:txBody>
       </p:sp>
@@ -2528,7 +3385,7 @@
             <a:fld id="{1D8BD707-D9CF-40AE-B4C6-C98DA3205C09}" type="datetimeFigureOut">
               <a:rPr lang="en-US" smtClean="0"/>
               <a:pPr/>
-              <a:t>8/7/2015</a:t>
+              <a:t>8/7/15</a:t>
             </a:fld>
             <a:endParaRPr lang="en-US"/>
           </a:p>
@@ -2577,7 +3434,145 @@
           </a:p>
         </p:txBody>
       </p:sp>
+      <p:sp>
+        <p:nvSpPr>
+          <p:cNvPr id="10" name="Rectangle 9"/>
+          <p:cNvSpPr/>
+          <p:nvPr/>
+        </p:nvSpPr>
+        <p:spPr>
+          <a:xfrm>
+            <a:off x="9036498" y="0"/>
+            <a:ext cx="107503" cy="6858000"/>
+          </a:xfrm>
+          <a:prstGeom prst="rect">
+            <a:avLst/>
+          </a:prstGeom>
+          <a:gradFill>
+            <a:gsLst>
+              <a:gs pos="0">
+                <a:schemeClr val="accent6">
+                  <a:lumMod val="75000"/>
+                </a:schemeClr>
+              </a:gs>
+              <a:gs pos="50000">
+                <a:schemeClr val="accent6">
+                  <a:lumMod val="60000"/>
+                  <a:lumOff val="40000"/>
+                </a:schemeClr>
+              </a:gs>
+              <a:gs pos="100000">
+                <a:schemeClr val="accent6">
+                  <a:lumMod val="40000"/>
+                  <a:lumOff val="60000"/>
+                  <a:alpha val="69000"/>
+                </a:schemeClr>
+              </a:gs>
+            </a:gsLst>
+            <a:lin ang="5400000" scaled="0"/>
+          </a:gradFill>
+          <a:ln>
+            <a:noFill/>
+          </a:ln>
+        </p:spPr>
+        <p:style>
+          <a:lnRef idx="2">
+            <a:schemeClr val="accent1">
+              <a:shade val="50000"/>
+            </a:schemeClr>
+          </a:lnRef>
+          <a:fillRef idx="1">
+            <a:schemeClr val="accent1"/>
+          </a:fillRef>
+          <a:effectRef idx="0">
+            <a:schemeClr val="accent1"/>
+          </a:effectRef>
+          <a:fontRef idx="minor">
+            <a:schemeClr val="lt1"/>
+          </a:fontRef>
+        </p:style>
+        <p:txBody>
+          <a:bodyPr rtlCol="0" anchor="ctr"/>
+          <a:lstStyle/>
+          <a:p>
+            <a:pPr algn="ctr"/>
+            <a:endParaRPr lang="en-IN" sz="1167"/>
+          </a:p>
+        </p:txBody>
+      </p:sp>
+      <p:sp>
+        <p:nvSpPr>
+          <p:cNvPr id="11" name="Rectangle 10"/>
+          <p:cNvSpPr/>
+          <p:nvPr/>
+        </p:nvSpPr>
+        <p:spPr>
+          <a:xfrm rot="10800000" flipV="1">
+            <a:off x="107505" y="702924"/>
+            <a:ext cx="8928991" cy="61780"/>
+          </a:xfrm>
+          <a:prstGeom prst="rect">
+            <a:avLst/>
+          </a:prstGeom>
+          <a:gradFill flip="none" rotWithShape="1">
+            <a:gsLst>
+              <a:gs pos="0">
+                <a:schemeClr val="accent6">
+                  <a:lumMod val="75000"/>
+                </a:schemeClr>
+              </a:gs>
+              <a:gs pos="50000">
+                <a:schemeClr val="accent6">
+                  <a:lumMod val="60000"/>
+                  <a:lumOff val="40000"/>
+                </a:schemeClr>
+              </a:gs>
+              <a:gs pos="100000">
+                <a:schemeClr val="accent6">
+                  <a:lumMod val="40000"/>
+                  <a:lumOff val="60000"/>
+                  <a:alpha val="0"/>
+                </a:schemeClr>
+              </a:gs>
+            </a:gsLst>
+            <a:lin ang="0" scaled="1"/>
+            <a:tileRect/>
+          </a:gradFill>
+          <a:ln>
+            <a:noFill/>
+          </a:ln>
+        </p:spPr>
+        <p:style>
+          <a:lnRef idx="2">
+            <a:schemeClr val="accent1">
+              <a:shade val="50000"/>
+            </a:schemeClr>
+          </a:lnRef>
+          <a:fillRef idx="1">
+            <a:schemeClr val="accent1"/>
+          </a:fillRef>
+          <a:effectRef idx="0">
+            <a:schemeClr val="accent1"/>
+          </a:effectRef>
+          <a:fontRef idx="minor">
+            <a:schemeClr val="lt1"/>
+          </a:fontRef>
+        </p:style>
+        <p:txBody>
+          <a:bodyPr rtlCol="0" anchor="ctr"/>
+          <a:lstStyle/>
+          <a:p>
+            <a:pPr algn="ctr"/>
+            <a:endParaRPr lang="en-IN" sz="1800"/>
+          </a:p>
+        </p:txBody>
+      </p:sp>
     </p:spTree>
+    <p:extLst>
+      <p:ext uri="{BB962C8B-B14F-4D97-AF65-F5344CB8AC3E}">
+        <p14:creationId xmlns:p14="http://schemas.microsoft.com/office/powerpoint/2010/main" val="198619204"/>
+      </p:ext>
+    </p:extLst>
   </p:cSld>
   <p:clrMapOvr>
     <a:masterClrMapping/>
@@ -2621,7 +3616,7 @@
               <a:rPr lang="en-US" smtClean="0"/>
               <a:t>Click to edit Master title style</a:t>
             </a:r>
-            <a:endParaRPr lang="en-US"/>
+            <a:endParaRPr lang="en-IN"/>
           </a:p>
         </p:txBody>
       </p:sp>
@@ -2643,7 +3638,7 @@
             <a:fld id="{1D8BD707-D9CF-40AE-B4C6-C98DA3205C09}" type="datetimeFigureOut">
               <a:rPr lang="en-US" smtClean="0"/>
               <a:pPr/>
-              <a:t>8/7/2015</a:t>
+              <a:t>8/7/15</a:t>
             </a:fld>
             <a:endParaRPr lang="en-US"/>
           </a:p>
@@ -2692,7 +3687,145 @@
           </a:p>
         </p:txBody>
       </p:sp>
+      <p:sp>
+        <p:nvSpPr>
+          <p:cNvPr id="6" name="Rectangle 5"/>
+          <p:cNvSpPr/>
+          <p:nvPr/>
+        </p:nvSpPr>
+        <p:spPr>
+          <a:xfrm>
+            <a:off x="9036498" y="0"/>
+            <a:ext cx="107503" cy="6858000"/>
+          </a:xfrm>
+          <a:prstGeom prst="rect">
+            <a:avLst/>
+          </a:prstGeom>
+          <a:gradFill>
+            <a:gsLst>
+              <a:gs pos="0">
+                <a:schemeClr val="accent6">
+                  <a:lumMod val="75000"/>
+                </a:schemeClr>
+              </a:gs>
+              <a:gs pos="50000">
+                <a:schemeClr val="accent6">
+                  <a:lumMod val="60000"/>
+                  <a:lumOff val="40000"/>
+                </a:schemeClr>
+              </a:gs>
+              <a:gs pos="100000">
+                <a:schemeClr val="accent6">
+                  <a:lumMod val="40000"/>
+                  <a:lumOff val="60000"/>
+                  <a:alpha val="69000"/>
+                </a:schemeClr>
+              </a:gs>
+            </a:gsLst>
+            <a:lin ang="5400000" scaled="0"/>
+          </a:gradFill>
+          <a:ln>
+            <a:noFill/>
+          </a:ln>
+        </p:spPr>
+        <p:style>
+          <a:lnRef idx="2">
+            <a:schemeClr val="accent1">
+              <a:shade val="50000"/>
+            </a:schemeClr>
+          </a:lnRef>
+          <a:fillRef idx="1">
+            <a:schemeClr val="accent1"/>
+          </a:fillRef>
+          <a:effectRef idx="0">
+            <a:schemeClr val="accent1"/>
+          </a:effectRef>
+          <a:fontRef idx="minor">
+            <a:schemeClr val="lt1"/>
+          </a:fontRef>
+        </p:style>
+        <p:txBody>
+          <a:bodyPr rtlCol="0" anchor="ctr"/>
+          <a:lstStyle/>
+          <a:p>
+            <a:pPr algn="ctr"/>
+            <a:endParaRPr lang="en-IN" sz="1167"/>
+          </a:p>
+        </p:txBody>
+      </p:sp>
+      <p:sp>
+        <p:nvSpPr>
+          <p:cNvPr id="7" name="Rectangle 6"/>
+          <p:cNvSpPr/>
+          <p:nvPr/>
+        </p:nvSpPr>
+        <p:spPr>
+          <a:xfrm rot="10800000" flipV="1">
+            <a:off x="107505" y="702924"/>
+            <a:ext cx="8928991" cy="61780"/>
+          </a:xfrm>
+          <a:prstGeom prst="rect">
+            <a:avLst/>
+          </a:prstGeom>
+          <a:gradFill flip="none" rotWithShape="1">
+            <a:gsLst>
+              <a:gs pos="0">
+                <a:schemeClr val="accent6">
+                  <a:lumMod val="75000"/>
+                </a:schemeClr>
+              </a:gs>
+              <a:gs pos="50000">
+                <a:schemeClr val="accent6">
+                  <a:lumMod val="60000"/>
+                  <a:lumOff val="40000"/>
+                </a:schemeClr>
+              </a:gs>
+              <a:gs pos="100000">
+                <a:schemeClr val="accent6">
+                  <a:lumMod val="40000"/>
+                  <a:lumOff val="60000"/>
+                  <a:alpha val="0"/>
+                </a:schemeClr>
+              </a:gs>
+            </a:gsLst>
+            <a:lin ang="0" scaled="1"/>
+            <a:tileRect/>
+          </a:gradFill>
+          <a:ln>
+            <a:noFill/>
+          </a:ln>
+        </p:spPr>
+        <p:style>
+          <a:lnRef idx="2">
+            <a:schemeClr val="accent1">
+              <a:shade val="50000"/>
+            </a:schemeClr>
+          </a:lnRef>
+          <a:fillRef idx="1">
+            <a:schemeClr val="accent1"/>
+          </a:fillRef>
+          <a:effectRef idx="0">
+            <a:schemeClr val="accent1"/>
+          </a:effectRef>
+          <a:fontRef idx="minor">
+            <a:schemeClr val="lt1"/>
+          </a:fontRef>
+        </p:style>
+        <p:txBody>
+          <a:bodyPr rtlCol="0" anchor="ctr"/>
+          <a:lstStyle/>
+          <a:p>
+            <a:pPr algn="ctr"/>
+            <a:endParaRPr lang="en-IN" sz="1800"/>
+          </a:p>
+        </p:txBody>
+      </p:sp>
     </p:spTree>
+    <p:extLst>
+      <p:ext uri="{BB962C8B-B14F-4D97-AF65-F5344CB8AC3E}">
+        <p14:creationId xmlns:p14="http://schemas.microsoft.com/office/powerpoint/2010/main" val="1374631287"/>
+      </p:ext>
+    </p:extLst>
   </p:cSld>
   <p:clrMapOvr>
     <a:masterClrMapping/>
@@ -2735,7 +3868,7 @@
             <a:fld id="{1D8BD707-D9CF-40AE-B4C6-C98DA3205C09}" type="datetimeFigureOut">
               <a:rPr lang="en-US" smtClean="0"/>
               <a:pPr/>
-              <a:t>8/7/2015</a:t>
+              <a:t>8/7/15</a:t>
             </a:fld>
             <a:endParaRPr lang="en-US"/>
           </a:p>
@@ -2784,7 +3917,145 @@
           </a:p>
         </p:txBody>
       </p:sp>
+      <p:sp>
+        <p:nvSpPr>
+          <p:cNvPr id="5" name="Rectangle 4"/>
+          <p:cNvSpPr/>
+          <p:nvPr/>
+        </p:nvSpPr>
+        <p:spPr>
+          <a:xfrm>
+            <a:off x="9036498" y="0"/>
+            <a:ext cx="107503" cy="6858000"/>
+          </a:xfrm>
+          <a:prstGeom prst="rect">
+            <a:avLst/>
+          </a:prstGeom>
+          <a:gradFill>
+            <a:gsLst>
+              <a:gs pos="0">
+                <a:schemeClr val="accent6">
+                  <a:lumMod val="75000"/>
+                </a:schemeClr>
+              </a:gs>
+              <a:gs pos="50000">
+                <a:schemeClr val="accent6">
+                  <a:lumMod val="60000"/>
+                  <a:lumOff val="40000"/>
+                </a:schemeClr>
+              </a:gs>
+              <a:gs pos="100000">
+                <a:schemeClr val="accent6">
+                  <a:lumMod val="40000"/>
+                  <a:lumOff val="60000"/>
+                  <a:alpha val="69000"/>
+                </a:schemeClr>
+              </a:gs>
+            </a:gsLst>
+            <a:lin ang="5400000" scaled="0"/>
+          </a:gradFill>
+          <a:ln>
+            <a:noFill/>
+          </a:ln>
+        </p:spPr>
+        <p:style>
+          <a:lnRef idx="2">
+            <a:schemeClr val="accent1">
+              <a:shade val="50000"/>
+            </a:schemeClr>
+          </a:lnRef>
+          <a:fillRef idx="1">
+            <a:schemeClr val="accent1"/>
+          </a:fillRef>
+          <a:effectRef idx="0">
+            <a:schemeClr val="accent1"/>
+          </a:effectRef>
+          <a:fontRef idx="minor">
+            <a:schemeClr val="lt1"/>
+          </a:fontRef>
+        </p:style>
+        <p:txBody>
+          <a:bodyPr rtlCol="0" anchor="ctr"/>
+          <a:lstStyle/>
+          <a:p>
+            <a:pPr algn="ctr"/>
+            <a:endParaRPr lang="en-IN" sz="1167"/>
+          </a:p>
+        </p:txBody>
+      </p:sp>
+      <p:sp>
+        <p:nvSpPr>
+          <p:cNvPr id="6" name="Rectangle 5"/>
+          <p:cNvSpPr/>
+          <p:nvPr/>
+        </p:nvSpPr>
+        <p:spPr>
+          <a:xfrm rot="10800000" flipV="1">
+            <a:off x="107505" y="702924"/>
+            <a:ext cx="8928991" cy="61780"/>
+          </a:xfrm>
+          <a:prstGeom prst="rect">
+            <a:avLst/>
+          </a:prstGeom>
+          <a:gradFill flip="none" rotWithShape="1">
+            <a:gsLst>
+              <a:gs pos="0">
+                <a:schemeClr val="accent6">
+                  <a:lumMod val="75000"/>
+                </a:schemeClr>
+              </a:gs>
+              <a:gs pos="50000">
+                <a:schemeClr val="accent6">
+                  <a:lumMod val="60000"/>
+                  <a:lumOff val="40000"/>
+                </a:schemeClr>
+              </a:gs>
+              <a:gs pos="100000">
+                <a:schemeClr val="accent6">
+                  <a:lumMod val="40000"/>
+                  <a:lumOff val="60000"/>
+                  <a:alpha val="0"/>
+                </a:schemeClr>
+              </a:gs>
+            </a:gsLst>
+            <a:lin ang="0" scaled="1"/>
+            <a:tileRect/>
+          </a:gradFill>
+          <a:ln>
+            <a:noFill/>
+          </a:ln>
+        </p:spPr>
+        <p:style>
+          <a:lnRef idx="2">
+            <a:schemeClr val="accent1">
+              <a:shade val="50000"/>
+            </a:schemeClr>
+          </a:lnRef>
+          <a:fillRef idx="1">
+            <a:schemeClr val="accent1"/>
+          </a:fillRef>
+          <a:effectRef idx="0">
+            <a:schemeClr val="accent1"/>
+          </a:effectRef>
+          <a:fontRef idx="minor">
+            <a:schemeClr val="lt1"/>
+          </a:fontRef>
+        </p:style>
+        <p:txBody>
+          <a:bodyPr rtlCol="0" anchor="ctr"/>
+          <a:lstStyle/>
+          <a:p>
+            <a:pPr algn="ctr"/>
+            <a:endParaRPr lang="en-IN" sz="1800"/>
+          </a:p>
+        </p:txBody>
+      </p:sp>
     </p:spTree>
+    <p:extLst>
+      <p:ext uri="{BB962C8B-B14F-4D97-AF65-F5344CB8AC3E}">
+        <p14:creationId xmlns:p14="http://schemas.microsoft.com/office/powerpoint/2010/main" val="1992232983"/>
+      </p:ext>
+    </p:extLst>
   </p:cSld>
   <p:clrMapOvr>
     <a:masterClrMapping/>
@@ -2821,7 +4092,7 @@
         </p:nvSpPr>
         <p:spPr>
           <a:xfrm>
-            <a:off x="457200" y="273050"/>
+            <a:off x="457201" y="273051"/>
             <a:ext cx="3008313" cy="1162050"/>
           </a:xfrm>
         </p:spPr>
@@ -2829,7 +4100,7 @@
           <a:bodyPr anchor="b"/>
           <a:lstStyle>
             <a:lvl1pPr algn="l">
-              <a:defRPr sz="2000" b="1"/>
+              <a:defRPr sz="1667" b="1"/>
             </a:lvl1pPr>
           </a:lstStyle>
           <a:p>
@@ -2837,7 +4108,7 @@
               <a:rPr lang="en-US" smtClean="0"/>
               <a:t>Click to edit Master title style</a:t>
             </a:r>
-            <a:endParaRPr lang="en-US"/>
+            <a:endParaRPr lang="en-IN"/>
           </a:p>
         </p:txBody>
       </p:sp>
@@ -2853,7 +4124,7 @@
         </p:nvSpPr>
         <p:spPr>
           <a:xfrm>
-            <a:off x="3575050" y="273050"/>
+            <a:off x="3575051" y="273052"/>
             <a:ext cx="5111750" cy="5853113"/>
           </a:xfrm>
         </p:spPr>
@@ -2861,31 +4132,31 @@
           <a:bodyPr/>
           <a:lstStyle>
             <a:lvl1pPr>
-              <a:defRPr sz="3200"/>
+              <a:defRPr sz="2667"/>
             </a:lvl1pPr>
             <a:lvl2pPr>
-              <a:defRPr sz="2800"/>
+              <a:defRPr sz="2333"/>
             </a:lvl2pPr>
             <a:lvl3pPr>
-              <a:defRPr sz="2400"/>
+              <a:defRPr sz="2000"/>
             </a:lvl3pPr>
             <a:lvl4pPr>
-              <a:defRPr sz="2000"/>
+              <a:defRPr sz="1667"/>
             </a:lvl4pPr>
             <a:lvl5pPr>
-              <a:defRPr sz="2000"/>
+              <a:defRPr sz="1667"/>
             </a:lvl5pPr>
             <a:lvl6pPr>
-              <a:defRPr sz="2000"/>
+              <a:defRPr sz="1667"/>
             </a:lvl6pPr>
             <a:lvl7pPr>
-              <a:defRPr sz="2000"/>
+              <a:defRPr sz="1667"/>
             </a:lvl7pPr>
             <a:lvl8pPr>
-              <a:defRPr sz="2000"/>
+              <a:defRPr sz="1667"/>
             </a:lvl8pPr>
             <a:lvl9pPr>
-              <a:defRPr sz="2000"/>
+              <a:defRPr sz="1667"/>
             </a:lvl9pPr>
           </a:lstStyle>
           <a:p>
@@ -2922,7 +4193,7 @@
               <a:rPr lang="en-US" smtClean="0"/>
               <a:t>Fifth level</a:t>
             </a:r>
-            <a:endParaRPr lang="en-US"/>
+            <a:endParaRPr lang="en-IN"/>
           </a:p>
         </p:txBody>
       </p:sp>
@@ -2938,7 +4209,7 @@
         </p:nvSpPr>
         <p:spPr>
           <a:xfrm>
-            <a:off x="457200" y="1435100"/>
+            <a:off x="457201" y="1435102"/>
             <a:ext cx="3008313" cy="4691063"/>
           </a:xfrm>
         </p:spPr>
@@ -2947,39 +4218,39 @@
           <a:lstStyle>
             <a:lvl1pPr marL="0" indent="0">
               <a:buNone/>
-              <a:defRPr sz="1400"/>
+              <a:defRPr sz="1167"/>
             </a:lvl1pPr>
-            <a:lvl2pPr marL="457200" indent="0">
-              <a:buNone/>
-              <a:defRPr sz="1200"/>
-            </a:lvl2pPr>
-            <a:lvl3pPr marL="914400" indent="0">
+            <a:lvl2pPr marL="380985" indent="0">
               <a:buNone/>
               <a:defRPr sz="1000"/>
+            </a:lvl2pPr>
+            <a:lvl3pPr marL="761970" indent="0">
+              <a:buNone/>
+              <a:defRPr sz="833"/>
             </a:lvl3pPr>
-            <a:lvl4pPr marL="1371600" indent="0">
+            <a:lvl4pPr marL="1142954" indent="0">
               <a:buNone/>
-              <a:defRPr sz="900"/>
+              <a:defRPr sz="750"/>
             </a:lvl4pPr>
-            <a:lvl5pPr marL="1828800" indent="0">
+            <a:lvl5pPr marL="1523939" indent="0">
               <a:buNone/>
-              <a:defRPr sz="900"/>
+              <a:defRPr sz="750"/>
             </a:lvl5pPr>
-            <a:lvl6pPr marL="2286000" indent="0">
+            <a:lvl6pPr marL="1904924" indent="0">
               <a:buNone/>
-              <a:defRPr sz="900"/>
+              <a:defRPr sz="750"/>
             </a:lvl6pPr>
-            <a:lvl7pPr marL="2743200" indent="0">
+            <a:lvl7pPr marL="2285909" indent="0">
               <a:buNone/>
-              <a:defRPr sz="900"/>
+              <a:defRPr sz="750"/>
             </a:lvl7pPr>
-            <a:lvl8pPr marL="3200400" indent="0">
+            <a:lvl8pPr marL="2666893" indent="0">
               <a:buNone/>
-              <a:defRPr sz="900"/>
+              <a:defRPr sz="750"/>
             </a:lvl8pPr>
-            <a:lvl9pPr marL="3657600" indent="0">
+            <a:lvl9pPr marL="3047878" indent="0">
               <a:buNone/>
-              <a:defRPr sz="900"/>
+              <a:defRPr sz="750"/>
             </a:lvl9pPr>
           </a:lstStyle>
           <a:p>
@@ -3009,7 +4280,7 @@
             <a:fld id="{1D8BD707-D9CF-40AE-B4C6-C98DA3205C09}" type="datetimeFigureOut">
               <a:rPr lang="en-US" smtClean="0"/>
               <a:pPr/>
-              <a:t>8/7/2015</a:t>
+              <a:t>8/7/15</a:t>
             </a:fld>
             <a:endParaRPr lang="en-US"/>
           </a:p>
@@ -3059,6 +4330,11 @@
         </p:txBody>
       </p:sp>
     </p:spTree>
+    <p:extLst>
+      <p:ext uri="{BB962C8B-B14F-4D97-AF65-F5344CB8AC3E}">
+        <p14:creationId xmlns:p14="http://schemas.microsoft.com/office/powerpoint/2010/main" val="1806119540"/>
+      </p:ext>
+    </p:extLst>
   </p:cSld>
   <p:clrMapOvr>
     <a:masterClrMapping/>
@@ -3103,7 +4379,7 @@
           <a:bodyPr anchor="b"/>
           <a:lstStyle>
             <a:lvl1pPr algn="l">
-              <a:defRPr sz="2000" b="1"/>
+              <a:defRPr sz="1667" b="1"/>
             </a:lvl1pPr>
           </a:lstStyle>
           <a:p>
@@ -3111,7 +4387,7 @@
               <a:rPr lang="en-US" smtClean="0"/>
               <a:t>Click to edit Master title style</a:t>
             </a:r>
-            <a:endParaRPr lang="en-US"/>
+            <a:endParaRPr lang="en-IN"/>
           </a:p>
         </p:txBody>
       </p:sp>
@@ -3136,43 +4412,47 @@
           <a:lstStyle>
             <a:lvl1pPr marL="0" indent="0">
               <a:buNone/>
-              <a:defRPr sz="3200"/>
+              <a:defRPr sz="2667"/>
             </a:lvl1pPr>
-            <a:lvl2pPr marL="457200" indent="0">
+            <a:lvl2pPr marL="380985" indent="0">
               <a:buNone/>
-              <a:defRPr sz="2800"/>
+              <a:defRPr sz="2333"/>
             </a:lvl2pPr>
-            <a:lvl3pPr marL="914400" indent="0">
-              <a:buNone/>
-              <a:defRPr sz="2400"/>
-            </a:lvl3pPr>
-            <a:lvl4pPr marL="1371600" indent="0">
+            <a:lvl3pPr marL="761970" indent="0">
               <a:buNone/>
               <a:defRPr sz="2000"/>
+            </a:lvl3pPr>
+            <a:lvl4pPr marL="1142954" indent="0">
+              <a:buNone/>
+              <a:defRPr sz="1667"/>
             </a:lvl4pPr>
-            <a:lvl5pPr marL="1828800" indent="0">
+            <a:lvl5pPr marL="1523939" indent="0">
               <a:buNone/>
-              <a:defRPr sz="2000"/>
+              <a:defRPr sz="1667"/>
             </a:lvl5pPr>
-            <a:lvl6pPr marL="2286000" indent="0">
+            <a:lvl6pPr marL="1904924" indent="0">
               <a:buNone/>
-              <a:defRPr sz="2000"/>
+              <a:defRPr sz="1667"/>
             </a:lvl6pPr>
-            <a:lvl7pPr marL="2743200" indent="0">
+            <a:lvl7pPr marL="2285909" indent="0">
               <a:buNone/>
-              <a:defRPr sz="2000"/>
+              <a:defRPr sz="1667"/>
             </a:lvl7pPr>
-            <a:lvl8pPr marL="3200400" indent="0">
+            <a:lvl8pPr marL="2666893" indent="0">
               <a:buNone/>
-              <a:defRPr sz="2000"/>
+              <a:defRPr sz="1667"/>
             </a:lvl8pPr>
-            <a:lvl9pPr marL="3657600" indent="0">
+            <a:lvl9pPr marL="3047878" indent="0">
               <a:buNone/>
-              <a:defRPr sz="2000"/>
+              <a:defRPr sz="1667"/>
             </a:lvl9pPr>
           </a:lstStyle>
           <a:p>
-            <a:endParaRPr lang="en-US"/>
+            <a:r>
+              <a:rPr lang="en-US" smtClean="0"/>
+              <a:t>Drag picture to placeholder or click icon to add</a:t>
+            </a:r>
+            <a:endParaRPr lang="en-IN"/>
           </a:p>
         </p:txBody>
       </p:sp>
@@ -3197,39 +4477,39 @@
           <a:lstStyle>
             <a:lvl1pPr marL="0" indent="0">
               <a:buNone/>
-              <a:defRPr sz="1400"/>
+              <a:defRPr sz="1167"/>
             </a:lvl1pPr>
-            <a:lvl2pPr marL="457200" indent="0">
-              <a:buNone/>
-              <a:defRPr sz="1200"/>
-            </a:lvl2pPr>
-            <a:lvl3pPr marL="914400" indent="0">
+            <a:lvl2pPr marL="380985" indent="0">
               <a:buNone/>
               <a:defRPr sz="1000"/>
+            </a:lvl2pPr>
+            <a:lvl3pPr marL="761970" indent="0">
+              <a:buNone/>
+              <a:defRPr sz="833"/>
             </a:lvl3pPr>
-            <a:lvl4pPr marL="1371600" indent="0">
+            <a:lvl4pPr marL="1142954" indent="0">
               <a:buNone/>
-              <a:defRPr sz="900"/>
+              <a:defRPr sz="750"/>
             </a:lvl4pPr>
-            <a:lvl5pPr marL="1828800" indent="0">
+            <a:lvl5pPr marL="1523939" indent="0">
               <a:buNone/>
-              <a:defRPr sz="900"/>
+              <a:defRPr sz="750"/>
             </a:lvl5pPr>
-            <a:lvl6pPr marL="2286000" indent="0">
+            <a:lvl6pPr marL="1904924" indent="0">
               <a:buNone/>
-              <a:defRPr sz="900"/>
+              <a:defRPr sz="750"/>
             </a:lvl6pPr>
-            <a:lvl7pPr marL="2743200" indent="0">
+            <a:lvl7pPr marL="2285909" indent="0">
               <a:buNone/>
-              <a:defRPr sz="900"/>
+              <a:defRPr sz="750"/>
             </a:lvl7pPr>
-            <a:lvl8pPr marL="3200400" indent="0">
+            <a:lvl8pPr marL="2666893" indent="0">
               <a:buNone/>
-              <a:defRPr sz="900"/>
+              <a:defRPr sz="750"/>
             </a:lvl8pPr>
-            <a:lvl9pPr marL="3657600" indent="0">
+            <a:lvl9pPr marL="3047878" indent="0">
               <a:buNone/>
-              <a:defRPr sz="900"/>
+              <a:defRPr sz="750"/>
             </a:lvl9pPr>
           </a:lstStyle>
           <a:p>
@@ -3259,7 +4539,7 @@
             <a:fld id="{1D8BD707-D9CF-40AE-B4C6-C98DA3205C09}" type="datetimeFigureOut">
               <a:rPr lang="en-US" smtClean="0"/>
               <a:pPr/>
-              <a:t>8/7/2015</a:t>
+              <a:t>8/7/15</a:t>
             </a:fld>
             <a:endParaRPr lang="en-US"/>
           </a:p>
@@ -3309,6 +4589,11 @@
         </p:txBody>
       </p:sp>
     </p:spTree>
+    <p:extLst>
+      <p:ext uri="{BB962C8B-B14F-4D97-AF65-F5344CB8AC3E}">
+        <p14:creationId xmlns:p14="http://schemas.microsoft.com/office/powerpoint/2010/main" val="2138078721"/>
+      </p:ext>
+    </p:extLst>
   </p:cSld>
   <p:clrMapOvr>
     <a:masterClrMapping/>
@@ -3350,8 +4635,8 @@
         </p:nvSpPr>
         <p:spPr>
           <a:xfrm>
-            <a:off x="457200" y="274638"/>
-            <a:ext cx="8229600" cy="1143000"/>
+            <a:off x="107505" y="116633"/>
+            <a:ext cx="8928992" cy="576064"/>
           </a:xfrm>
           <a:prstGeom prst="rect">
             <a:avLst/>
@@ -3367,7 +4652,7 @@
               <a:rPr lang="en-US" smtClean="0"/>
               <a:t>Click to edit Master title style</a:t>
             </a:r>
-            <a:endParaRPr lang="en-US"/>
+            <a:endParaRPr lang="en-IN" dirty="0"/>
           </a:p>
         </p:txBody>
       </p:sp>
@@ -3383,8 +4668,8 @@
         </p:nvSpPr>
         <p:spPr>
           <a:xfrm>
-            <a:off x="457200" y="1600200"/>
-            <a:ext cx="8229600" cy="4525963"/>
+            <a:off x="107505" y="764704"/>
+            <a:ext cx="8928992" cy="5544616"/>
           </a:xfrm>
           <a:prstGeom prst="rect">
             <a:avLst/>
@@ -3429,7 +4714,7 @@
               <a:rPr lang="en-US" smtClean="0"/>
               <a:t>Fifth level</a:t>
             </a:r>
-            <a:endParaRPr lang="en-US"/>
+            <a:endParaRPr lang="en-IN" dirty="0"/>
           </a:p>
         </p:txBody>
       </p:sp>
@@ -3445,7 +4730,7 @@
         </p:nvSpPr>
         <p:spPr>
           <a:xfrm>
-            <a:off x="457200" y="6356350"/>
+            <a:off x="29388" y="6469087"/>
             <a:ext cx="2133600" cy="365125"/>
           </a:xfrm>
           <a:prstGeom prst="rect">
@@ -3456,7 +4741,7 @@
           <a:bodyPr vert="horz" lIns="91440" tIns="45720" rIns="91440" bIns="45720" rtlCol="0" anchor="ctr"/>
           <a:lstStyle>
             <a:lvl1pPr algn="l">
-              <a:defRPr sz="1200">
+              <a:defRPr sz="1000">
                 <a:solidFill>
                   <a:schemeClr val="tx1">
                     <a:tint val="75000"/>
@@ -3469,7 +4754,7 @@
             <a:fld id="{1D8BD707-D9CF-40AE-B4C6-C98DA3205C09}" type="datetimeFigureOut">
               <a:rPr lang="en-US" smtClean="0"/>
               <a:pPr/>
-              <a:t>8/7/2015</a:t>
+              <a:t>8/7/15</a:t>
             </a:fld>
             <a:endParaRPr lang="en-US"/>
           </a:p>
@@ -3487,7 +4772,7 @@
         </p:nvSpPr>
         <p:spPr>
           <a:xfrm>
-            <a:off x="3124200" y="6356350"/>
+            <a:off x="3147325" y="6469087"/>
             <a:ext cx="2895600" cy="365125"/>
           </a:xfrm>
           <a:prstGeom prst="rect">
@@ -3498,7 +4783,7 @@
           <a:bodyPr vert="horz" lIns="91440" tIns="45720" rIns="91440" bIns="45720" rtlCol="0" anchor="ctr"/>
           <a:lstStyle>
             <a:lvl1pPr algn="ctr">
-              <a:defRPr sz="1200">
+              <a:defRPr sz="1000">
                 <a:solidFill>
                   <a:schemeClr val="tx1">
                     <a:tint val="75000"/>
@@ -3524,7 +4809,7 @@
         </p:nvSpPr>
         <p:spPr>
           <a:xfrm>
-            <a:off x="6553200" y="6356350"/>
+            <a:off x="6873577" y="6474087"/>
             <a:ext cx="2133600" cy="365125"/>
           </a:xfrm>
           <a:prstGeom prst="rect">
@@ -3535,7 +4820,7 @@
           <a:bodyPr vert="horz" lIns="91440" tIns="45720" rIns="91440" bIns="45720" rtlCol="0" anchor="ctr"/>
           <a:lstStyle>
             <a:lvl1pPr algn="r">
-              <a:defRPr sz="1200">
+              <a:defRPr sz="1000">
                 <a:solidFill>
                   <a:schemeClr val="tx1">
                     <a:tint val="75000"/>
@@ -3555,29 +4840,35 @@
         </p:txBody>
       </p:sp>
     </p:spTree>
+    <p:extLst>
+      <p:ext uri="{BB962C8B-B14F-4D97-AF65-F5344CB8AC3E}">
+        <p14:creationId xmlns:p14="http://schemas.microsoft.com/office/powerpoint/2010/main" val="75191653"/>
+      </p:ext>
+    </p:extLst>
   </p:cSld>
   <p:clrMap bg1="lt1" tx1="dk1" bg2="lt2" tx2="dk2" accent1="accent1" accent2="accent2" accent3="accent3" accent4="accent4" accent5="accent5" accent6="accent6" hlink="hlink" folHlink="folHlink"/>
   <p:sldLayoutIdLst>
-    <p:sldLayoutId id="2147483649" r:id="rId1"/>
-    <p:sldLayoutId id="2147483650" r:id="rId2"/>
-    <p:sldLayoutId id="2147483651" r:id="rId3"/>
-    <p:sldLayoutId id="2147483652" r:id="rId4"/>
-    <p:sldLayoutId id="2147483653" r:id="rId5"/>
-    <p:sldLayoutId id="2147483654" r:id="rId6"/>
-    <p:sldLayoutId id="2147483655" r:id="rId7"/>
-    <p:sldLayoutId id="2147483656" r:id="rId8"/>
-    <p:sldLayoutId id="2147483657" r:id="rId9"/>
-    <p:sldLayoutId id="2147483658" r:id="rId10"/>
-    <p:sldLayoutId id="2147483659" r:id="rId11"/>
+    <p:sldLayoutId id="2147483674" r:id="rId1"/>
+    <p:sldLayoutId id="2147483675" r:id="rId2"/>
+    <p:sldLayoutId id="2147483676" r:id="rId3"/>
+    <p:sldLayoutId id="2147483677" r:id="rId4"/>
+    <p:sldLayoutId id="2147483678" r:id="rId5"/>
+    <p:sldLayoutId id="2147483679" r:id="rId6"/>
+    <p:sldLayoutId id="2147483680" r:id="rId7"/>
+    <p:sldLayoutId id="2147483681" r:id="rId8"/>
+    <p:sldLayoutId id="2147483682" r:id="rId9"/>
+    <p:sldLayoutId id="2147483683" r:id="rId10"/>
+    <p:sldLayoutId id="2147483684" r:id="rId11"/>
+    <p:sldLayoutId id="2147483685" r:id="rId12"/>
   </p:sldLayoutIdLst>
   <p:txStyles>
     <p:titleStyle>
-      <a:lvl1pPr algn="ctr" defTabSz="914400" rtl="0" eaLnBrk="1" latinLnBrk="0" hangingPunct="1">
+      <a:lvl1pPr algn="l" defTabSz="761970" rtl="0" eaLnBrk="1" latinLnBrk="0" hangingPunct="1">
         <a:spcBef>
           <a:spcPct val="0"/>
         </a:spcBef>
         <a:buNone/>
-        <a:defRPr sz="4400" kern="1200">
+        <a:defRPr sz="2667" kern="1200">
           <a:solidFill>
             <a:schemeClr val="tx1"/>
           </a:solidFill>
@@ -3588,13 +4879,13 @@
       </a:lvl1pPr>
     </p:titleStyle>
     <p:bodyStyle>
-      <a:lvl1pPr marL="342900" indent="-342900" algn="l" defTabSz="914400" rtl="0" eaLnBrk="1" latinLnBrk="0" hangingPunct="1">
+      <a:lvl1pPr marL="285739" indent="-285739" algn="l" defTabSz="761970" rtl="0" eaLnBrk="1" latinLnBrk="0" hangingPunct="1">
         <a:spcBef>
           <a:spcPct val="20000"/>
         </a:spcBef>
-        <a:buFont typeface="Arial" pitchFamily="34" charset="0"/>
+        <a:buFont typeface="Arial" panose="020B0604020202020204" pitchFamily="34" charset="0"/>
         <a:buChar char="•"/>
-        <a:defRPr sz="3200" kern="1200">
+        <a:defRPr sz="1833" kern="1200">
           <a:solidFill>
             <a:schemeClr val="tx1"/>
           </a:solidFill>
@@ -3603,13 +4894,13 @@
           <a:cs typeface="+mn-cs"/>
         </a:defRPr>
       </a:lvl1pPr>
-      <a:lvl2pPr marL="742950" indent="-285750" algn="l" defTabSz="914400" rtl="0" eaLnBrk="1" latinLnBrk="0" hangingPunct="1">
+      <a:lvl2pPr marL="619100" indent="-238115" algn="l" defTabSz="761970" rtl="0" eaLnBrk="1" latinLnBrk="0" hangingPunct="1">
         <a:spcBef>
           <a:spcPct val="20000"/>
         </a:spcBef>
-        <a:buFont typeface="Arial" pitchFamily="34" charset="0"/>
+        <a:buFont typeface="Arial" panose="020B0604020202020204" pitchFamily="34" charset="0"/>
         <a:buChar char="–"/>
-        <a:defRPr sz="2800" kern="1200">
+        <a:defRPr sz="1667" kern="1200">
           <a:solidFill>
             <a:schemeClr val="tx1"/>
           </a:solidFill>
@@ -3618,13 +4909,13 @@
           <a:cs typeface="+mn-cs"/>
         </a:defRPr>
       </a:lvl2pPr>
-      <a:lvl3pPr marL="1143000" indent="-228600" algn="l" defTabSz="914400" rtl="0" eaLnBrk="1" latinLnBrk="0" hangingPunct="1">
+      <a:lvl3pPr marL="952462" indent="-190492" algn="l" defTabSz="761970" rtl="0" eaLnBrk="1" latinLnBrk="0" hangingPunct="1">
         <a:spcBef>
           <a:spcPct val="20000"/>
         </a:spcBef>
-        <a:buFont typeface="Arial" pitchFamily="34" charset="0"/>
+        <a:buFont typeface="Arial" panose="020B0604020202020204" pitchFamily="34" charset="0"/>
         <a:buChar char="•"/>
-        <a:defRPr sz="2400" kern="1200">
+        <a:defRPr sz="1500" kern="1200">
           <a:solidFill>
             <a:schemeClr val="tx1"/>
           </a:solidFill>
@@ -3633,13 +4924,13 @@
           <a:cs typeface="+mn-cs"/>
         </a:defRPr>
       </a:lvl3pPr>
-      <a:lvl4pPr marL="1600200" indent="-228600" algn="l" defTabSz="914400" rtl="0" eaLnBrk="1" latinLnBrk="0" hangingPunct="1">
+      <a:lvl4pPr marL="1333447" indent="-190492" algn="l" defTabSz="761970" rtl="0" eaLnBrk="1" latinLnBrk="0" hangingPunct="1">
         <a:spcBef>
           <a:spcPct val="20000"/>
         </a:spcBef>
-        <a:buFont typeface="Arial" pitchFamily="34" charset="0"/>
+        <a:buFont typeface="Arial" panose="020B0604020202020204" pitchFamily="34" charset="0"/>
         <a:buChar char="–"/>
-        <a:defRPr sz="2000" kern="1200">
+        <a:defRPr sz="1333" kern="1200">
           <a:solidFill>
             <a:schemeClr val="tx1"/>
           </a:solidFill>
@@ -3648,13 +4939,13 @@
           <a:cs typeface="+mn-cs"/>
         </a:defRPr>
       </a:lvl4pPr>
-      <a:lvl5pPr marL="2057400" indent="-228600" algn="l" defTabSz="914400" rtl="0" eaLnBrk="1" latinLnBrk="0" hangingPunct="1">
+      <a:lvl5pPr marL="1714431" indent="-190492" algn="l" defTabSz="761970" rtl="0" eaLnBrk="1" latinLnBrk="0" hangingPunct="1">
         <a:spcBef>
           <a:spcPct val="20000"/>
         </a:spcBef>
-        <a:buFont typeface="Arial" pitchFamily="34" charset="0"/>
+        <a:buFont typeface="Arial" panose="020B0604020202020204" pitchFamily="34" charset="0"/>
         <a:buChar char="»"/>
-        <a:defRPr sz="2000" kern="1200">
+        <a:defRPr sz="1167" kern="1200">
           <a:solidFill>
             <a:schemeClr val="tx1"/>
           </a:solidFill>
@@ -3663,13 +4954,13 @@
           <a:cs typeface="+mn-cs"/>
         </a:defRPr>
       </a:lvl5pPr>
-      <a:lvl6pPr marL="2514600" indent="-228600" algn="l" defTabSz="914400" rtl="0" eaLnBrk="1" latinLnBrk="0" hangingPunct="1">
+      <a:lvl6pPr marL="2095416" indent="-190492" algn="l" defTabSz="761970" rtl="0" eaLnBrk="1" latinLnBrk="0" hangingPunct="1">
         <a:spcBef>
           <a:spcPct val="20000"/>
         </a:spcBef>
-        <a:buFont typeface="Arial" pitchFamily="34" charset="0"/>
+        <a:buFont typeface="Arial" panose="020B0604020202020204" pitchFamily="34" charset="0"/>
         <a:buChar char="•"/>
-        <a:defRPr sz="2000" kern="1200">
+        <a:defRPr sz="1667" kern="1200">
           <a:solidFill>
             <a:schemeClr val="tx1"/>
           </a:solidFill>
@@ -3678,13 +4969,13 @@
           <a:cs typeface="+mn-cs"/>
         </a:defRPr>
       </a:lvl6pPr>
-      <a:lvl7pPr marL="2971800" indent="-228600" algn="l" defTabSz="914400" rtl="0" eaLnBrk="1" latinLnBrk="0" hangingPunct="1">
+      <a:lvl7pPr marL="2476401" indent="-190492" algn="l" defTabSz="761970" rtl="0" eaLnBrk="1" latinLnBrk="0" hangingPunct="1">
         <a:spcBef>
           <a:spcPct val="20000"/>
         </a:spcBef>
-        <a:buFont typeface="Arial" pitchFamily="34" charset="0"/>
+        <a:buFont typeface="Arial" panose="020B0604020202020204" pitchFamily="34" charset="0"/>
         <a:buChar char="•"/>
-        <a:defRPr sz="2000" kern="1200">
+        <a:defRPr sz="1667" kern="1200">
           <a:solidFill>
             <a:schemeClr val="tx1"/>
           </a:solidFill>
@@ -3693,13 +4984,13 @@
           <a:cs typeface="+mn-cs"/>
         </a:defRPr>
       </a:lvl7pPr>
-      <a:lvl8pPr marL="3429000" indent="-228600" algn="l" defTabSz="914400" rtl="0" eaLnBrk="1" latinLnBrk="0" hangingPunct="1">
+      <a:lvl8pPr marL="2857386" indent="-190492" algn="l" defTabSz="761970" rtl="0" eaLnBrk="1" latinLnBrk="0" hangingPunct="1">
         <a:spcBef>
           <a:spcPct val="20000"/>
         </a:spcBef>
-        <a:buFont typeface="Arial" pitchFamily="34" charset="0"/>
+        <a:buFont typeface="Arial" panose="020B0604020202020204" pitchFamily="34" charset="0"/>
         <a:buChar char="•"/>
-        <a:defRPr sz="2000" kern="1200">
+        <a:defRPr sz="1667" kern="1200">
           <a:solidFill>
             <a:schemeClr val="tx1"/>
           </a:solidFill>
@@ -3708,13 +4999,13 @@
           <a:cs typeface="+mn-cs"/>
         </a:defRPr>
       </a:lvl8pPr>
-      <a:lvl9pPr marL="3886200" indent="-228600" algn="l" defTabSz="914400" rtl="0" eaLnBrk="1" latinLnBrk="0" hangingPunct="1">
+      <a:lvl9pPr marL="3238370" indent="-190492" algn="l" defTabSz="761970" rtl="0" eaLnBrk="1" latinLnBrk="0" hangingPunct="1">
         <a:spcBef>
           <a:spcPct val="20000"/>
         </a:spcBef>
-        <a:buFont typeface="Arial" pitchFamily="34" charset="0"/>
+        <a:buFont typeface="Arial" panose="020B0604020202020204" pitchFamily="34" charset="0"/>
         <a:buChar char="•"/>
-        <a:defRPr sz="2000" kern="1200">
+        <a:defRPr sz="1667" kern="1200">
           <a:solidFill>
             <a:schemeClr val="tx1"/>
           </a:solidFill>
@@ -3728,8 +5019,8 @@
       <a:defPPr>
         <a:defRPr lang="en-US"/>
       </a:defPPr>
-      <a:lvl1pPr marL="0" algn="l" defTabSz="914400" rtl="0" eaLnBrk="1" latinLnBrk="0" hangingPunct="1">
-        <a:defRPr sz="1800" kern="1200">
+      <a:lvl1pPr marL="0" algn="l" defTabSz="761970" rtl="0" eaLnBrk="1" latinLnBrk="0" hangingPunct="1">
+        <a:defRPr sz="1500" kern="1200">
           <a:solidFill>
             <a:schemeClr val="tx1"/>
           </a:solidFill>
@@ -3738,8 +5029,8 @@
           <a:cs typeface="+mn-cs"/>
         </a:defRPr>
       </a:lvl1pPr>
-      <a:lvl2pPr marL="457200" algn="l" defTabSz="914400" rtl="0" eaLnBrk="1" latinLnBrk="0" hangingPunct="1">
-        <a:defRPr sz="1800" kern="1200">
+      <a:lvl2pPr marL="380985" algn="l" defTabSz="761970" rtl="0" eaLnBrk="1" latinLnBrk="0" hangingPunct="1">
+        <a:defRPr sz="1500" kern="1200">
           <a:solidFill>
             <a:schemeClr val="tx1"/>
           </a:solidFill>
@@ -3748,8 +5039,8 @@
           <a:cs typeface="+mn-cs"/>
         </a:defRPr>
       </a:lvl2pPr>
-      <a:lvl3pPr marL="914400" algn="l" defTabSz="914400" rtl="0" eaLnBrk="1" latinLnBrk="0" hangingPunct="1">
-        <a:defRPr sz="1800" kern="1200">
+      <a:lvl3pPr marL="761970" algn="l" defTabSz="761970" rtl="0" eaLnBrk="1" latinLnBrk="0" hangingPunct="1">
+        <a:defRPr sz="1500" kern="1200">
           <a:solidFill>
             <a:schemeClr val="tx1"/>
           </a:solidFill>
@@ -3758,8 +5049,8 @@
           <a:cs typeface="+mn-cs"/>
         </a:defRPr>
       </a:lvl3pPr>
-      <a:lvl4pPr marL="1371600" algn="l" defTabSz="914400" rtl="0" eaLnBrk="1" latinLnBrk="0" hangingPunct="1">
-        <a:defRPr sz="1800" kern="1200">
+      <a:lvl4pPr marL="1142954" algn="l" defTabSz="761970" rtl="0" eaLnBrk="1" latinLnBrk="0" hangingPunct="1">
+        <a:defRPr sz="1500" kern="1200">
           <a:solidFill>
             <a:schemeClr val="tx1"/>
           </a:solidFill>
@@ -3768,8 +5059,8 @@
           <a:cs typeface="+mn-cs"/>
         </a:defRPr>
       </a:lvl4pPr>
-      <a:lvl5pPr marL="1828800" algn="l" defTabSz="914400" rtl="0" eaLnBrk="1" latinLnBrk="0" hangingPunct="1">
-        <a:defRPr sz="1800" kern="1200">
+      <a:lvl5pPr marL="1523939" algn="l" defTabSz="761970" rtl="0" eaLnBrk="1" latinLnBrk="0" hangingPunct="1">
+        <a:defRPr sz="1500" kern="1200">
           <a:solidFill>
             <a:schemeClr val="tx1"/>
           </a:solidFill>
@@ -3778,8 +5069,8 @@
           <a:cs typeface="+mn-cs"/>
         </a:defRPr>
       </a:lvl5pPr>
-      <a:lvl6pPr marL="2286000" algn="l" defTabSz="914400" rtl="0" eaLnBrk="1" latinLnBrk="0" hangingPunct="1">
-        <a:defRPr sz="1800" kern="1200">
+      <a:lvl6pPr marL="1904924" algn="l" defTabSz="761970" rtl="0" eaLnBrk="1" latinLnBrk="0" hangingPunct="1">
+        <a:defRPr sz="1500" kern="1200">
           <a:solidFill>
             <a:schemeClr val="tx1"/>
           </a:solidFill>
@@ -3788,8 +5079,8 @@
           <a:cs typeface="+mn-cs"/>
         </a:defRPr>
       </a:lvl6pPr>
-      <a:lvl7pPr marL="2743200" algn="l" defTabSz="914400" rtl="0" eaLnBrk="1" latinLnBrk="0" hangingPunct="1">
-        <a:defRPr sz="1800" kern="1200">
+      <a:lvl7pPr marL="2285909" algn="l" defTabSz="761970" rtl="0" eaLnBrk="1" latinLnBrk="0" hangingPunct="1">
+        <a:defRPr sz="1500" kern="1200">
           <a:solidFill>
             <a:schemeClr val="tx1"/>
           </a:solidFill>
@@ -3798,8 +5089,8 @@
           <a:cs typeface="+mn-cs"/>
         </a:defRPr>
       </a:lvl7pPr>
-      <a:lvl8pPr marL="3200400" algn="l" defTabSz="914400" rtl="0" eaLnBrk="1" latinLnBrk="0" hangingPunct="1">
-        <a:defRPr sz="1800" kern="1200">
+      <a:lvl8pPr marL="2666893" algn="l" defTabSz="761970" rtl="0" eaLnBrk="1" latinLnBrk="0" hangingPunct="1">
+        <a:defRPr sz="1500" kern="1200">
           <a:solidFill>
             <a:schemeClr val="tx1"/>
           </a:solidFill>
@@ -3808,8 +5099,8 @@
           <a:cs typeface="+mn-cs"/>
         </a:defRPr>
       </a:lvl8pPr>
-      <a:lvl9pPr marL="3657600" algn="l" defTabSz="914400" rtl="0" eaLnBrk="1" latinLnBrk="0" hangingPunct="1">
-        <a:defRPr sz="1800" kern="1200">
+      <a:lvl9pPr marL="3047878" algn="l" defTabSz="761970" rtl="0" eaLnBrk="1" latinLnBrk="0" hangingPunct="1">
+        <a:defRPr sz="1500" kern="1200">
           <a:solidFill>
             <a:schemeClr val="tx1"/>
           </a:solidFill>
@@ -3932,8 +5223,8 @@
         </p:nvSpPr>
         <p:spPr>
           <a:xfrm rot="5400000">
-            <a:off x="4457700" y="2019300"/>
-            <a:ext cx="8229600" cy="1143000"/>
+            <a:off x="7492581" y="3478288"/>
+            <a:ext cx="2326838" cy="706621"/>
           </a:xfrm>
         </p:spPr>
         <p:txBody>
@@ -3956,7 +5247,7 @@
         </p:nvSpPr>
         <p:spPr>
           <a:xfrm>
-            <a:off x="2667000" y="1"/>
+            <a:off x="2909194" y="1"/>
             <a:ext cx="2741645" cy="3124200"/>
           </a:xfrm>
           <a:prstGeom prst="rect">
@@ -3997,7 +5288,7 @@
         </p:nvSpPr>
         <p:spPr>
           <a:xfrm>
-            <a:off x="4665" y="270588"/>
+            <a:off x="246859" y="270588"/>
             <a:ext cx="2514600" cy="1939212"/>
           </a:xfrm>
           <a:prstGeom prst="rect">
@@ -4038,7 +5329,7 @@
         </p:nvSpPr>
         <p:spPr>
           <a:xfrm>
-            <a:off x="2819399" y="3182512"/>
+            <a:off x="3061593" y="3182512"/>
             <a:ext cx="2514600" cy="3294488"/>
           </a:xfrm>
           <a:prstGeom prst="rect">
@@ -4079,7 +5370,7 @@
         </p:nvSpPr>
         <p:spPr>
           <a:xfrm>
-            <a:off x="12441" y="2819400"/>
+            <a:off x="254635" y="2819400"/>
             <a:ext cx="2514600" cy="3124200"/>
           </a:xfrm>
           <a:prstGeom prst="rect">
@@ -4120,7 +5411,7 @@
         </p:nvSpPr>
         <p:spPr>
           <a:xfrm>
-            <a:off x="5561045" y="3665376"/>
+            <a:off x="5803239" y="3665376"/>
             <a:ext cx="2514600" cy="3124200"/>
           </a:xfrm>
           <a:prstGeom prst="rect">
@@ -4161,8 +5452,8 @@
         </p:nvSpPr>
         <p:spPr>
           <a:xfrm>
-            <a:off x="5562600" y="304800"/>
-            <a:ext cx="2514600" cy="2819400"/>
+            <a:off x="5804794" y="533400"/>
+            <a:ext cx="2514600" cy="2590800"/>
           </a:xfrm>
           <a:prstGeom prst="rect">
             <a:avLst/>
@@ -4202,7 +5493,7 @@
         </p:nvSpPr>
         <p:spPr>
           <a:xfrm>
-            <a:off x="6237849" y="533400"/>
+            <a:off x="6466046" y="679298"/>
             <a:ext cx="1164101" cy="369332"/>
           </a:xfrm>
           <a:prstGeom prst="rect">
@@ -4231,7 +5522,7 @@
         </p:nvSpPr>
         <p:spPr>
           <a:xfrm>
-            <a:off x="6267922" y="3852370"/>
+            <a:off x="6510116" y="3852370"/>
             <a:ext cx="1134028" cy="369332"/>
           </a:xfrm>
           <a:prstGeom prst="rect">
@@ -4260,7 +5551,7 @@
         </p:nvSpPr>
         <p:spPr>
           <a:xfrm>
-            <a:off x="1326127" y="348734"/>
+            <a:off x="1568321" y="348734"/>
             <a:ext cx="1109599" cy="369332"/>
           </a:xfrm>
           <a:prstGeom prst="rect">
@@ -4289,7 +5580,7 @@
         </p:nvSpPr>
         <p:spPr>
           <a:xfrm>
-            <a:off x="613632" y="2990070"/>
+            <a:off x="855826" y="2990070"/>
             <a:ext cx="1857368" cy="369332"/>
           </a:xfrm>
           <a:prstGeom prst="rect">
@@ -4318,7 +5609,7 @@
         </p:nvSpPr>
         <p:spPr>
           <a:xfrm>
-            <a:off x="3447839" y="3411112"/>
+            <a:off x="3690033" y="3411112"/>
             <a:ext cx="1045479" cy="369332"/>
           </a:xfrm>
           <a:prstGeom prst="rect">
@@ -4347,7 +5638,7 @@
         </p:nvSpPr>
         <p:spPr>
           <a:xfrm>
-            <a:off x="2838570" y="24492"/>
+            <a:off x="3080764" y="24492"/>
             <a:ext cx="1654748" cy="369332"/>
           </a:xfrm>
           <a:prstGeom prst="rect">
@@ -4379,7 +5670,7 @@
         </p:nvCxnSpPr>
         <p:spPr>
           <a:xfrm flipV="1">
-            <a:off x="6818345" y="3124200"/>
+            <a:off x="7060539" y="3124200"/>
             <a:ext cx="1555" cy="541176"/>
           </a:xfrm>
           <a:prstGeom prst="straightConnector1">
@@ -4415,7 +5706,7 @@
         </p:nvCxnSpPr>
         <p:spPr>
           <a:xfrm rot="5400000" flipH="1">
-            <a:off x="2406520" y="4806821"/>
+            <a:off x="2648714" y="4806821"/>
             <a:ext cx="533400" cy="2806958"/>
           </a:xfrm>
           <a:prstGeom prst="bentConnector3">
@@ -4452,7 +5743,7 @@
         </p:nvCxnSpPr>
         <p:spPr>
           <a:xfrm flipV="1">
-            <a:off x="1269741" y="2209800"/>
+            <a:off x="1511935" y="2209800"/>
             <a:ext cx="0" cy="609600"/>
           </a:xfrm>
           <a:prstGeom prst="straightConnector1">
@@ -4485,7 +5776,7 @@
         </p:nvSpPr>
         <p:spPr>
           <a:xfrm>
-            <a:off x="966614" y="1563469"/>
+            <a:off x="1208808" y="1563469"/>
             <a:ext cx="1560427" cy="646331"/>
           </a:xfrm>
           <a:prstGeom prst="rect">
@@ -4526,7 +5817,7 @@
         </p:nvSpPr>
         <p:spPr>
           <a:xfrm>
-            <a:off x="-13594" y="476253"/>
+            <a:off x="228600" y="476253"/>
             <a:ext cx="2286000" cy="1169551"/>
           </a:xfrm>
           <a:prstGeom prst="rect">
@@ -4584,7 +5875,7 @@
         </p:nvSpPr>
         <p:spPr>
           <a:xfrm>
-            <a:off x="134238" y="3495861"/>
+            <a:off x="376432" y="3495861"/>
             <a:ext cx="1664751" cy="369332"/>
           </a:xfrm>
           <a:prstGeom prst="rect">
@@ -4613,7 +5904,7 @@
         </p:nvSpPr>
         <p:spPr>
           <a:xfrm>
-            <a:off x="149042" y="4236475"/>
+            <a:off x="391236" y="4236475"/>
             <a:ext cx="2301488" cy="1477328"/>
           </a:xfrm>
           <a:prstGeom prst="rect">
@@ -4668,7 +5959,7 @@
         </p:nvSpPr>
         <p:spPr>
           <a:xfrm>
-            <a:off x="2819400" y="3852370"/>
+            <a:off x="3061594" y="3852370"/>
             <a:ext cx="2747983" cy="2862322"/>
           </a:xfrm>
           <a:prstGeom prst="rect">
@@ -4790,7 +6081,7 @@
         </p:nvSpPr>
         <p:spPr>
           <a:xfrm>
-            <a:off x="2695768" y="377140"/>
+            <a:off x="2937962" y="377140"/>
             <a:ext cx="2865277" cy="2862322"/>
           </a:xfrm>
           <a:prstGeom prst="rect">
@@ -7929,25 +9220,6 @@
           </a:p>
         </p:txBody>
       </p:sp>
-      <p:sp>
-        <p:nvSpPr>
-          <p:cNvPr id="3" name="Text Placeholder 2"/>
-          <p:cNvSpPr>
-            <a:spLocks noGrp="1"/>
-          </p:cNvSpPr>
-          <p:nvPr>
-            <p:ph type="body" idx="1"/>
-          </p:nvPr>
-        </p:nvSpPr>
-        <p:spPr/>
-        <p:txBody>
-          <a:bodyPr/>
-          <a:lstStyle/>
-          <a:p>
-            <a:endParaRPr lang="en-US"/>
-          </a:p>
-        </p:txBody>
-      </p:sp>
     </p:spTree>
     <p:extLst>
       <p:ext uri="{BB962C8B-B14F-4D97-AF65-F5344CB8AC3E}">
@@ -7997,8 +9269,8 @@
         </p:nvSpPr>
         <p:spPr>
           <a:xfrm>
-            <a:off x="381000" y="-37890"/>
-            <a:ext cx="8229600" cy="1143000"/>
+            <a:off x="0" y="13238"/>
+            <a:ext cx="8610600" cy="652147"/>
           </a:xfrm>
         </p:spPr>
         <p:txBody>
@@ -8936,7 +10208,7 @@
         </p:nvSpPr>
         <p:spPr>
           <a:xfrm>
-            <a:off x="38100" y="228600"/>
+            <a:off x="67797" y="70800"/>
             <a:ext cx="5022337" cy="646331"/>
           </a:xfrm>
           <a:prstGeom prst="rect">
@@ -9826,12 +11098,14 @@
         </p:nvSpPr>
         <p:spPr>
           <a:xfrm>
-            <a:off x="457200" y="228600"/>
-            <a:ext cx="8229600" cy="1143000"/>
-          </a:xfrm>
-        </p:spPr>
-        <p:txBody>
-          <a:bodyPr/>
+            <a:off x="39757" y="53009"/>
+            <a:ext cx="8647043" cy="632791"/>
+          </a:xfrm>
+        </p:spPr>
+        <p:txBody>
+          <a:bodyPr>
+            <a:normAutofit/>
+          </a:bodyPr>
           <a:lstStyle/>
           <a:p>
             <a:r>
@@ -9855,7 +11129,7 @@
         <p:spPr/>
         <p:txBody>
           <a:bodyPr>
-            <a:normAutofit fontScale="77500" lnSpcReduction="20000"/>
+            <a:normAutofit/>
           </a:bodyPr>
           <a:lstStyle/>
           <a:p>
@@ -10012,8 +11286,8 @@
         </p:nvSpPr>
         <p:spPr>
           <a:xfrm>
-            <a:off x="457200" y="0"/>
-            <a:ext cx="8229600" cy="1143000"/>
+            <a:off x="53008" y="13252"/>
+            <a:ext cx="8633791" cy="649603"/>
           </a:xfrm>
         </p:spPr>
         <p:txBody>
@@ -10861,8 +12135,8 @@
         </p:nvSpPr>
         <p:spPr>
           <a:xfrm>
-            <a:off x="-26437" y="-152400"/>
-            <a:ext cx="6096000" cy="1173162"/>
+            <a:off x="0" y="15932"/>
+            <a:ext cx="5562600" cy="646537"/>
           </a:xfrm>
         </p:spPr>
         <p:txBody>
@@ -11378,7 +12652,7 @@
         </p:nvSpPr>
         <p:spPr>
           <a:xfrm>
-            <a:off x="215004" y="5170"/>
+            <a:off x="108987" y="97935"/>
             <a:ext cx="2056782" cy="584775"/>
           </a:xfrm>
           <a:prstGeom prst="rect">
@@ -11392,10 +12666,10 @@
           <a:lstStyle/>
           <a:p>
             <a:r>
-              <a:rPr lang="en-US" sz="3200" b="1" dirty="0" err="1"/>
+              <a:rPr lang="en-US" sz="3200" dirty="0" err="1"/>
               <a:t>DhcpAgent</a:t>
             </a:r>
-            <a:endParaRPr lang="en-US" sz="3200" b="1" dirty="0"/>
+            <a:endParaRPr lang="en-US" sz="3200" dirty="0"/>
           </a:p>
         </p:txBody>
       </p:sp>
@@ -13088,7 +14362,7 @@
         </p:nvSpPr>
         <p:spPr>
           <a:xfrm>
-            <a:off x="215004" y="5170"/>
+            <a:off x="69230" y="71430"/>
             <a:ext cx="2056782" cy="584775"/>
           </a:xfrm>
           <a:prstGeom prst="rect">
@@ -13102,10 +14376,10 @@
           <a:lstStyle/>
           <a:p>
             <a:r>
-              <a:rPr lang="en-US" sz="3200" b="1" dirty="0" err="1"/>
+              <a:rPr lang="en-US" sz="3200" dirty="0" err="1"/>
               <a:t>DhcpAgent</a:t>
             </a:r>
-            <a:endParaRPr lang="en-US" sz="3200" b="1" dirty="0"/>
+            <a:endParaRPr lang="en-US" sz="3200" dirty="0"/>
           </a:p>
         </p:txBody>
       </p:sp>
@@ -14182,24 +15456,24 @@
         </p:nvSpPr>
         <p:spPr>
           <a:xfrm>
-            <a:off x="3323107" y="0"/>
-            <a:ext cx="2401491" cy="646331"/>
+            <a:off x="66262" y="79513"/>
+            <a:ext cx="2684840" cy="584775"/>
           </a:xfrm>
           <a:prstGeom prst="rect">
             <a:avLst/>
           </a:prstGeom>
         </p:spPr>
         <p:txBody>
-          <a:bodyPr wrap="none">
+          <a:bodyPr wrap="square">
             <a:spAutoFit/>
           </a:bodyPr>
           <a:lstStyle/>
           <a:p>
             <a:r>
-              <a:rPr lang="en-US" sz="3600" dirty="0" smtClean="0"/>
+              <a:rPr lang="en-US" sz="3200" dirty="0" smtClean="0"/>
               <a:t>DHCP agent</a:t>
             </a:r>
-            <a:endParaRPr lang="en-US" sz="3600" dirty="0"/>
+            <a:endParaRPr lang="en-US" sz="3200" dirty="0"/>
           </a:p>
         </p:txBody>
       </p:sp>
@@ -15798,7 +17072,7 @@
 </file>
 
 <file path=ppt/theme/theme1.xml><?xml version="1.0" encoding="utf-8"?>
-<a:theme xmlns:a="http://schemas.openxmlformats.org/drawingml/2006/main" name="Office Theme">
+<a:theme xmlns:a="http://schemas.openxmlformats.org/drawingml/2006/main" name="SimpleOrangeLinePPT">
   <a:themeElements>
     <a:clrScheme name="Office">
       <a:dk1>
@@ -15872,6 +17146,7 @@
         <a:font script="Mong" typeface="Mongolian Baiti"/>
         <a:font script="Viet" typeface="Times New Roman"/>
         <a:font script="Uigh" typeface="Microsoft Uighur"/>
+        <a:font script="Geor" typeface="Sylfaen"/>
       </a:majorFont>
       <a:minorFont>
         <a:latin typeface="Calibri"/>
@@ -15906,6 +17181,7 @@
         <a:font script="Mong" typeface="Mongolian Baiti"/>
         <a:font script="Viet" typeface="Arial"/>
         <a:font script="Uigh" typeface="Microsoft Uighur"/>
+        <a:font script="Geor" typeface="Sylfaen"/>
       </a:minorFont>
     </a:fontScheme>
     <a:fmtScheme name="Office">
@@ -16077,6 +17353,11 @@
   </a:themeElements>
   <a:objectDefaults/>
   <a:extraClrSchemeLst/>
+  <a:extLst>
+    <a:ext uri="{05A4C25C-085E-4340-85A3-A5531E510DB2}">
+      <thm15:themeFamily xmlns:thm15="http://schemas.microsoft.com/office/thememl/2012/main" name="SimpleOrangeLinePPT" id="{B850F300-3A6F-5E44-B2B2-B19B4711B10F}" vid="{8B58572D-2C56-6F41-98C0-684C2D82D463}"/>
+    </a:ext>
+  </a:extLst>
 </a:theme>
 </file>
 

</xml_diff>